<commit_message>
add cors to koa, add error handling to fetch
</commit_message>
<xml_diff>
--- a/sig2/slides/SIG react 2.pptx
+++ b/sig2/slides/SIG react 2.pptx
@@ -4059,7 +4059,7 @@
         <p:spPr>
           <a:xfrm>
             <a:off x="7200000" y="360000"/>
-            <a:ext cx="1256760" cy="284400"/>
+            <a:ext cx="1256400" cy="284040"/>
           </a:xfrm>
           <a:prstGeom prst="rect">
             <a:avLst/>
@@ -4082,7 +4082,7 @@
         <p:spPr>
           <a:xfrm>
             <a:off x="0" y="4966560"/>
-            <a:ext cx="9141840" cy="174600"/>
+            <a:ext cx="9141480" cy="174240"/>
           </a:xfrm>
           <a:prstGeom prst="rect">
             <a:avLst/>
@@ -4139,7 +4139,7 @@
         <p:spPr>
           <a:xfrm>
             <a:off x="0" y="4966560"/>
-            <a:ext cx="9141840" cy="174600"/>
+            <a:ext cx="9141480" cy="174240"/>
           </a:xfrm>
           <a:prstGeom prst="rect">
             <a:avLst/>
@@ -4162,7 +4162,7 @@
         <p:spPr>
           <a:xfrm>
             <a:off x="648000" y="108000"/>
-            <a:ext cx="2878200" cy="646920"/>
+            <a:ext cx="2877840" cy="646560"/>
           </a:xfrm>
           <a:prstGeom prst="rect">
             <a:avLst/>
@@ -4443,7 +4443,7 @@
         <p:spPr>
           <a:xfrm>
             <a:off x="7200000" y="360000"/>
-            <a:ext cx="1256760" cy="284400"/>
+            <a:ext cx="1256400" cy="284040"/>
           </a:xfrm>
           <a:prstGeom prst="rect">
             <a:avLst/>
@@ -4466,7 +4466,7 @@
         <p:spPr>
           <a:xfrm>
             <a:off x="0" y="4966560"/>
-            <a:ext cx="9141840" cy="174600"/>
+            <a:ext cx="9141480" cy="174240"/>
           </a:xfrm>
           <a:prstGeom prst="rect">
             <a:avLst/>
@@ -4781,7 +4781,7 @@
         <p:spPr>
           <a:xfrm>
             <a:off x="7200000" y="360000"/>
-            <a:ext cx="1256760" cy="284400"/>
+            <a:ext cx="1256400" cy="284040"/>
           </a:xfrm>
           <a:prstGeom prst="rect">
             <a:avLst/>
@@ -4804,7 +4804,7 @@
         <p:spPr>
           <a:xfrm>
             <a:off x="0" y="4966560"/>
-            <a:ext cx="9141840" cy="174600"/>
+            <a:ext cx="9141480" cy="174240"/>
           </a:xfrm>
           <a:prstGeom prst="rect">
             <a:avLst/>
@@ -4857,7 +4857,7 @@
         <p:spPr>
           <a:xfrm>
             <a:off x="0" y="812880"/>
-            <a:ext cx="9141840" cy="3507840"/>
+            <a:ext cx="9141480" cy="3507480"/>
           </a:xfrm>
           <a:prstGeom prst="rect">
             <a:avLst/>
@@ -5149,7 +5149,7 @@
         <p:spPr>
           <a:xfrm>
             <a:off x="0" y="810000"/>
-            <a:ext cx="9141840" cy="3345840"/>
+            <a:ext cx="9141480" cy="3345480"/>
           </a:xfrm>
           <a:prstGeom prst="rect">
             <a:avLst/>
@@ -5171,7 +5171,7 @@
         <p:spPr>
           <a:xfrm>
             <a:off x="5400000" y="1548000"/>
-            <a:ext cx="3021840" cy="3021840"/>
+            <a:ext cx="3021480" cy="3021480"/>
           </a:xfrm>
           <a:prstGeom prst="rect">
             <a:avLst/>
@@ -5282,7 +5282,7 @@
         <p:spPr>
           <a:xfrm>
             <a:off x="720000" y="288000"/>
-            <a:ext cx="6621840" cy="501840"/>
+            <a:ext cx="6621480" cy="501480"/>
           </a:xfrm>
           <a:prstGeom prst="rect">
             <a:avLst/>
@@ -5331,7 +5331,7 @@
         <p:spPr>
           <a:xfrm>
             <a:off x="4968000" y="5004000"/>
-            <a:ext cx="3237840" cy="105840"/>
+            <a:ext cx="3237480" cy="105480"/>
           </a:xfrm>
           <a:prstGeom prst="rect">
             <a:avLst/>
@@ -5380,7 +5380,7 @@
         <p:spPr>
           <a:xfrm>
             <a:off x="8280000" y="5004000"/>
-            <a:ext cx="141840" cy="105840"/>
+            <a:ext cx="141480" cy="105480"/>
           </a:xfrm>
           <a:prstGeom prst="rect">
             <a:avLst/>
@@ -5404,7 +5404,7 @@
                 <a:spcPct val="100000"/>
               </a:lnSpc>
             </a:pPr>
-            <a:fld id="{4E32C8F1-6EF6-4A2C-A627-B524C8143D49}" type="slidenum">
+            <a:fld id="{62E884CA-AEFE-4919-99F5-CDA5659E1C2E}" type="slidenum">
               <a:rPr b="0" lang="en-US" sz="600" spc="-1" strike="noStrike">
                 <a:solidFill>
                   <a:srgbClr val="ffffff"/>
@@ -5429,7 +5429,7 @@
         <p:spPr>
           <a:xfrm>
             <a:off x="640080" y="822960"/>
-            <a:ext cx="6621840" cy="3885120"/>
+            <a:ext cx="6621480" cy="3884760"/>
           </a:xfrm>
           <a:prstGeom prst="rect">
             <a:avLst/>
@@ -5458,7 +5458,7 @@
             </a:endParaRPr>
           </a:p>
           <a:p>
-            <a:pPr marL="285840" indent="-283680">
+            <a:pPr marL="285840" indent="-283320">
               <a:lnSpc>
                 <a:spcPct val="120000"/>
               </a:lnSpc>
@@ -5552,7 +5552,7 @@
         <p:spPr>
           <a:xfrm>
             <a:off x="720000" y="288000"/>
-            <a:ext cx="6621840" cy="501840"/>
+            <a:ext cx="6621480" cy="501480"/>
           </a:xfrm>
           <a:prstGeom prst="rect">
             <a:avLst/>
@@ -5601,7 +5601,7 @@
         <p:spPr>
           <a:xfrm>
             <a:off x="4968000" y="5004000"/>
-            <a:ext cx="3237840" cy="105840"/>
+            <a:ext cx="3237480" cy="105480"/>
           </a:xfrm>
           <a:prstGeom prst="rect">
             <a:avLst/>
@@ -5650,7 +5650,7 @@
         <p:spPr>
           <a:xfrm>
             <a:off x="8280000" y="5004000"/>
-            <a:ext cx="141840" cy="105840"/>
+            <a:ext cx="141480" cy="105480"/>
           </a:xfrm>
           <a:prstGeom prst="rect">
             <a:avLst/>
@@ -5674,7 +5674,7 @@
                 <a:spcPct val="100000"/>
               </a:lnSpc>
             </a:pPr>
-            <a:fld id="{2FB0BDCA-9DA9-42FD-AE6F-F60551512965}" type="slidenum">
+            <a:fld id="{0C54FF32-62D1-4BF0-BD68-730A1AEDD802}" type="slidenum">
               <a:rPr b="0" lang="en-US" sz="600" spc="-1" strike="noStrike">
                 <a:solidFill>
                   <a:srgbClr val="ffffff"/>
@@ -5699,7 +5699,7 @@
         <p:spPr>
           <a:xfrm>
             <a:off x="640080" y="822960"/>
-            <a:ext cx="6621840" cy="3885120"/>
+            <a:ext cx="6621480" cy="3884760"/>
           </a:xfrm>
           <a:prstGeom prst="rect">
             <a:avLst/>
@@ -5728,7 +5728,7 @@
             </a:endParaRPr>
           </a:p>
           <a:p>
-            <a:pPr marL="285840" indent="-283680">
+            <a:pPr marL="285840" indent="-283320">
               <a:lnSpc>
                 <a:spcPct val="120000"/>
               </a:lnSpc>
@@ -5753,7 +5753,7 @@
             </a:endParaRPr>
           </a:p>
           <a:p>
-            <a:pPr marL="285840" indent="-283680">
+            <a:pPr marL="285840" indent="-283320">
               <a:lnSpc>
                 <a:spcPct val="120000"/>
               </a:lnSpc>
@@ -5778,7 +5778,7 @@
             </a:endParaRPr>
           </a:p>
           <a:p>
-            <a:pPr marL="285840" indent="-283680">
+            <a:pPr marL="285840" indent="-283320">
               <a:lnSpc>
                 <a:spcPct val="120000"/>
               </a:lnSpc>
@@ -5803,7 +5803,7 @@
             </a:endParaRPr>
           </a:p>
           <a:p>
-            <a:pPr marL="285840" indent="-283680">
+            <a:pPr marL="285840" indent="-283320">
               <a:lnSpc>
                 <a:spcPct val="120000"/>
               </a:lnSpc>
@@ -5828,7 +5828,7 @@
             </a:endParaRPr>
           </a:p>
           <a:p>
-            <a:pPr marL="285840" indent="-283680">
+            <a:pPr marL="285840" indent="-283320">
               <a:lnSpc>
                 <a:spcPct val="120000"/>
               </a:lnSpc>
@@ -5853,7 +5853,7 @@
             </a:endParaRPr>
           </a:p>
           <a:p>
-            <a:pPr marL="285840" indent="-283680">
+            <a:pPr marL="285840" indent="-283320">
               <a:lnSpc>
                 <a:spcPct val="120000"/>
               </a:lnSpc>
@@ -5878,7 +5878,7 @@
             </a:endParaRPr>
           </a:p>
           <a:p>
-            <a:pPr marL="285840" indent="-283680">
+            <a:pPr marL="285840" indent="-283320">
               <a:lnSpc>
                 <a:spcPct val="120000"/>
               </a:lnSpc>
@@ -5972,7 +5972,7 @@
         <p:spPr>
           <a:xfrm>
             <a:off x="720000" y="288000"/>
-            <a:ext cx="6621840" cy="501840"/>
+            <a:ext cx="6621480" cy="501480"/>
           </a:xfrm>
           <a:prstGeom prst="rect">
             <a:avLst/>
@@ -6021,7 +6021,7 @@
         <p:spPr>
           <a:xfrm>
             <a:off x="4968000" y="5004000"/>
-            <a:ext cx="3237840" cy="105840"/>
+            <a:ext cx="3237480" cy="105480"/>
           </a:xfrm>
           <a:prstGeom prst="rect">
             <a:avLst/>
@@ -6070,7 +6070,7 @@
         <p:spPr>
           <a:xfrm>
             <a:off x="8280000" y="5004000"/>
-            <a:ext cx="141840" cy="105840"/>
+            <a:ext cx="141480" cy="105480"/>
           </a:xfrm>
           <a:prstGeom prst="rect">
             <a:avLst/>
@@ -6094,7 +6094,7 @@
                 <a:spcPct val="100000"/>
               </a:lnSpc>
             </a:pPr>
-            <a:fld id="{C0738892-9577-44E0-8047-5B52F8CC8E90}" type="slidenum">
+            <a:fld id="{530E8619-112D-4109-BB18-B52B8EB8B07C}" type="slidenum">
               <a:rPr b="0" lang="en-US" sz="600" spc="-1" strike="noStrike">
                 <a:solidFill>
                   <a:srgbClr val="ffffff"/>
@@ -6119,7 +6119,7 @@
         <p:spPr>
           <a:xfrm>
             <a:off x="601560" y="822960"/>
-            <a:ext cx="6621840" cy="3885120"/>
+            <a:ext cx="6621480" cy="3884760"/>
           </a:xfrm>
           <a:prstGeom prst="rect">
             <a:avLst/>
@@ -6148,7 +6148,7 @@
             </a:endParaRPr>
           </a:p>
           <a:p>
-            <a:pPr marL="285840" indent="-283680">
+            <a:pPr marL="285840" indent="-283320">
               <a:lnSpc>
                 <a:spcPct val="120000"/>
               </a:lnSpc>
@@ -6242,7 +6242,7 @@
         <p:spPr>
           <a:xfrm>
             <a:off x="720000" y="288000"/>
-            <a:ext cx="6621840" cy="501840"/>
+            <a:ext cx="6621480" cy="501480"/>
           </a:xfrm>
           <a:prstGeom prst="rect">
             <a:avLst/>
@@ -6291,7 +6291,7 @@
         <p:spPr>
           <a:xfrm>
             <a:off x="4968000" y="5004000"/>
-            <a:ext cx="3237840" cy="105840"/>
+            <a:ext cx="3237480" cy="105480"/>
           </a:xfrm>
           <a:prstGeom prst="rect">
             <a:avLst/>
@@ -6340,7 +6340,7 @@
         <p:spPr>
           <a:xfrm>
             <a:off x="8280000" y="5004000"/>
-            <a:ext cx="141840" cy="105840"/>
+            <a:ext cx="141480" cy="105480"/>
           </a:xfrm>
           <a:prstGeom prst="rect">
             <a:avLst/>
@@ -6364,7 +6364,7 @@
                 <a:spcPct val="100000"/>
               </a:lnSpc>
             </a:pPr>
-            <a:fld id="{FB44A603-79E4-41FE-A6DA-BE5EDC9EE7BB}" type="slidenum">
+            <a:fld id="{F5049480-AF0E-4644-925B-0179361D7E37}" type="slidenum">
               <a:rPr b="0" lang="en-US" sz="600" spc="-1" strike="noStrike">
                 <a:solidFill>
                   <a:srgbClr val="ffffff"/>
@@ -6389,7 +6389,7 @@
         <p:spPr>
           <a:xfrm>
             <a:off x="601560" y="822960"/>
-            <a:ext cx="6621840" cy="3885120"/>
+            <a:ext cx="6621480" cy="3884760"/>
           </a:xfrm>
           <a:prstGeom prst="rect">
             <a:avLst/>
@@ -6418,7 +6418,7 @@
             </a:endParaRPr>
           </a:p>
           <a:p>
-            <a:pPr marL="285840" indent="-283680">
+            <a:pPr marL="285840" indent="-283320">
               <a:lnSpc>
                 <a:spcPct val="120000"/>
               </a:lnSpc>
@@ -6443,7 +6443,7 @@
             </a:endParaRPr>
           </a:p>
           <a:p>
-            <a:pPr marL="285840" indent="-283680">
+            <a:pPr marL="285840" indent="-283320">
               <a:lnSpc>
                 <a:spcPct val="120000"/>
               </a:lnSpc>
@@ -6468,7 +6468,7 @@
             </a:endParaRPr>
           </a:p>
           <a:p>
-            <a:pPr marL="285840" indent="-283680">
+            <a:pPr marL="285840" indent="-283320">
               <a:lnSpc>
                 <a:spcPct val="120000"/>
               </a:lnSpc>
@@ -6493,7 +6493,7 @@
             </a:endParaRPr>
           </a:p>
           <a:p>
-            <a:pPr marL="285840" indent="-283680">
+            <a:pPr marL="285840" indent="-283320">
               <a:lnSpc>
                 <a:spcPct val="120000"/>
               </a:lnSpc>
@@ -6577,7 +6577,7 @@
         <p:spPr>
           <a:xfrm>
             <a:off x="720000" y="288000"/>
-            <a:ext cx="6621840" cy="501840"/>
+            <a:ext cx="6621480" cy="501480"/>
           </a:xfrm>
           <a:prstGeom prst="rect">
             <a:avLst/>
@@ -6626,7 +6626,7 @@
         <p:spPr>
           <a:xfrm>
             <a:off x="4968000" y="5004000"/>
-            <a:ext cx="3237840" cy="105840"/>
+            <a:ext cx="3237480" cy="105480"/>
           </a:xfrm>
           <a:prstGeom prst="rect">
             <a:avLst/>
@@ -6675,7 +6675,7 @@
         <p:spPr>
           <a:xfrm>
             <a:off x="8280000" y="5004000"/>
-            <a:ext cx="141840" cy="105840"/>
+            <a:ext cx="141480" cy="105480"/>
           </a:xfrm>
           <a:prstGeom prst="rect">
             <a:avLst/>
@@ -6699,7 +6699,7 @@
                 <a:spcPct val="100000"/>
               </a:lnSpc>
             </a:pPr>
-            <a:fld id="{0D516826-7CB0-41E9-AB3F-D8EC9F6A626A}" type="slidenum">
+            <a:fld id="{DA259B76-D83A-4EE4-8E45-538BA1F1561F}" type="slidenum">
               <a:rPr b="0" lang="en-US" sz="600" spc="-1" strike="noStrike">
                 <a:solidFill>
                   <a:srgbClr val="ffffff"/>
@@ -6773,7 +6773,7 @@
         <p:spPr>
           <a:xfrm>
             <a:off x="720000" y="288000"/>
-            <a:ext cx="6621840" cy="501840"/>
+            <a:ext cx="6621480" cy="501480"/>
           </a:xfrm>
           <a:prstGeom prst="rect">
             <a:avLst/>
@@ -6822,7 +6822,7 @@
         <p:spPr>
           <a:xfrm>
             <a:off x="4968000" y="5004000"/>
-            <a:ext cx="3237840" cy="105840"/>
+            <a:ext cx="3237480" cy="105480"/>
           </a:xfrm>
           <a:prstGeom prst="rect">
             <a:avLst/>
@@ -6871,7 +6871,7 @@
         <p:spPr>
           <a:xfrm>
             <a:off x="8280000" y="5004000"/>
-            <a:ext cx="141840" cy="105840"/>
+            <a:ext cx="141480" cy="105480"/>
           </a:xfrm>
           <a:prstGeom prst="rect">
             <a:avLst/>
@@ -6895,7 +6895,7 @@
                 <a:spcPct val="100000"/>
               </a:lnSpc>
             </a:pPr>
-            <a:fld id="{2F9E9626-9957-40A2-8BB5-78E772DE5D80}" type="slidenum">
+            <a:fld id="{B34A1996-7766-46C5-A3AA-C9FE23D50D53}" type="slidenum">
               <a:rPr b="0" lang="en-US" sz="600" spc="-1" strike="noStrike">
                 <a:solidFill>
                   <a:srgbClr val="ffffff"/>
@@ -6969,7 +6969,7 @@
         <p:spPr>
           <a:xfrm>
             <a:off x="720000" y="288000"/>
-            <a:ext cx="6621840" cy="501840"/>
+            <a:ext cx="6621480" cy="501480"/>
           </a:xfrm>
           <a:prstGeom prst="rect">
             <a:avLst/>
@@ -7018,7 +7018,7 @@
         <p:spPr>
           <a:xfrm>
             <a:off x="4968000" y="5004000"/>
-            <a:ext cx="3237840" cy="105840"/>
+            <a:ext cx="3237480" cy="105480"/>
           </a:xfrm>
           <a:prstGeom prst="rect">
             <a:avLst/>
@@ -7067,7 +7067,7 @@
         <p:spPr>
           <a:xfrm>
             <a:off x="8280000" y="5004000"/>
-            <a:ext cx="141840" cy="105840"/>
+            <a:ext cx="141480" cy="105480"/>
           </a:xfrm>
           <a:prstGeom prst="rect">
             <a:avLst/>
@@ -7091,7 +7091,7 @@
                 <a:spcPct val="100000"/>
               </a:lnSpc>
             </a:pPr>
-            <a:fld id="{8C5EEC30-1A4A-4EB4-B7C2-754180F53AB1}" type="slidenum">
+            <a:fld id="{603D960A-B9C2-409E-B70A-F30568AFC718}" type="slidenum">
               <a:rPr b="0" lang="en-US" sz="600" spc="-1" strike="noStrike">
                 <a:solidFill>
                   <a:srgbClr val="ffffff"/>
@@ -7165,7 +7165,7 @@
         <p:spPr>
           <a:xfrm>
             <a:off x="720000" y="288000"/>
-            <a:ext cx="6621840" cy="501840"/>
+            <a:ext cx="6621480" cy="501480"/>
           </a:xfrm>
           <a:prstGeom prst="rect">
             <a:avLst/>
@@ -7214,7 +7214,7 @@
         <p:spPr>
           <a:xfrm>
             <a:off x="4968000" y="5004000"/>
-            <a:ext cx="3237840" cy="105840"/>
+            <a:ext cx="3237480" cy="105480"/>
           </a:xfrm>
           <a:prstGeom prst="rect">
             <a:avLst/>
@@ -7263,7 +7263,7 @@
         <p:spPr>
           <a:xfrm>
             <a:off x="8280000" y="5004000"/>
-            <a:ext cx="141840" cy="105840"/>
+            <a:ext cx="141480" cy="105480"/>
           </a:xfrm>
           <a:prstGeom prst="rect">
             <a:avLst/>
@@ -7287,7 +7287,7 @@
                 <a:spcPct val="100000"/>
               </a:lnSpc>
             </a:pPr>
-            <a:fld id="{9F440A53-8636-4ADC-AE2C-6B30808C3ACA}" type="slidenum">
+            <a:fld id="{C8A8612E-A9C3-411B-96DB-E3415CE6B460}" type="slidenum">
               <a:rPr b="0" lang="en-US" sz="600" spc="-1" strike="noStrike">
                 <a:solidFill>
                   <a:srgbClr val="ffffff"/>
@@ -7361,7 +7361,7 @@
         <p:spPr>
           <a:xfrm>
             <a:off x="720000" y="288000"/>
-            <a:ext cx="6621840" cy="501840"/>
+            <a:ext cx="6621480" cy="501480"/>
           </a:xfrm>
           <a:prstGeom prst="rect">
             <a:avLst/>
@@ -7410,7 +7410,7 @@
         <p:spPr>
           <a:xfrm>
             <a:off x="4968000" y="5004000"/>
-            <a:ext cx="3237840" cy="105840"/>
+            <a:ext cx="3237480" cy="105480"/>
           </a:xfrm>
           <a:prstGeom prst="rect">
             <a:avLst/>
@@ -7459,7 +7459,7 @@
         <p:spPr>
           <a:xfrm>
             <a:off x="8280000" y="5004000"/>
-            <a:ext cx="141840" cy="105840"/>
+            <a:ext cx="141480" cy="105480"/>
           </a:xfrm>
           <a:prstGeom prst="rect">
             <a:avLst/>
@@ -7483,7 +7483,7 @@
                 <a:spcPct val="100000"/>
               </a:lnSpc>
             </a:pPr>
-            <a:fld id="{60A4386A-9D08-41E9-8DA0-AC476FD33686}" type="slidenum">
+            <a:fld id="{E96F4A3B-0C9A-41E5-B4F0-FB6B212F1093}" type="slidenum">
               <a:rPr b="0" lang="en-US" sz="600" spc="-1" strike="noStrike">
                 <a:solidFill>
                   <a:srgbClr val="ffffff"/>
@@ -7557,7 +7557,7 @@
         <p:spPr>
           <a:xfrm>
             <a:off x="720000" y="288000"/>
-            <a:ext cx="6621840" cy="501840"/>
+            <a:ext cx="6621480" cy="501480"/>
           </a:xfrm>
           <a:prstGeom prst="rect">
             <a:avLst/>
@@ -7606,7 +7606,7 @@
         <p:spPr>
           <a:xfrm>
             <a:off x="2347200" y="2194560"/>
-            <a:ext cx="2405880" cy="776880"/>
+            <a:ext cx="2405520" cy="776520"/>
           </a:xfrm>
           <a:prstGeom prst="rect">
             <a:avLst/>
@@ -7655,7 +7655,7 @@
         <p:spPr>
           <a:xfrm>
             <a:off x="4968000" y="5004000"/>
-            <a:ext cx="3237840" cy="105840"/>
+            <a:ext cx="3237480" cy="105480"/>
           </a:xfrm>
           <a:prstGeom prst="rect">
             <a:avLst/>
@@ -7704,7 +7704,7 @@
         <p:spPr>
           <a:xfrm>
             <a:off x="8280000" y="5004000"/>
-            <a:ext cx="141840" cy="105840"/>
+            <a:ext cx="141480" cy="105480"/>
           </a:xfrm>
           <a:prstGeom prst="rect">
             <a:avLst/>
@@ -7728,7 +7728,7 @@
                 <a:spcPct val="100000"/>
               </a:lnSpc>
             </a:pPr>
-            <a:fld id="{82E44BF0-CEBD-435E-8497-A6FF7C1A7D84}" type="slidenum">
+            <a:fld id="{04FF087D-2C17-4D5A-9F14-EF270898002C}" type="slidenum">
               <a:rPr b="0" lang="en-US" sz="600" spc="-1" strike="noStrike">
                 <a:solidFill>
                   <a:srgbClr val="ffffff"/>
@@ -7757,7 +7757,7 @@
         <p:spPr>
           <a:xfrm>
             <a:off x="6840000" y="810000"/>
-            <a:ext cx="2301840" cy="3507840"/>
+            <a:ext cx="2301480" cy="3507480"/>
           </a:xfrm>
           <a:prstGeom prst="rect">
             <a:avLst/>
@@ -7828,7 +7828,7 @@
         <p:spPr>
           <a:xfrm>
             <a:off x="720000" y="288000"/>
-            <a:ext cx="6621840" cy="501840"/>
+            <a:ext cx="6621480" cy="501480"/>
           </a:xfrm>
           <a:prstGeom prst="rect">
             <a:avLst/>
@@ -7877,7 +7877,7 @@
         <p:spPr>
           <a:xfrm>
             <a:off x="4968000" y="5004000"/>
-            <a:ext cx="3237840" cy="105840"/>
+            <a:ext cx="3237480" cy="105480"/>
           </a:xfrm>
           <a:prstGeom prst="rect">
             <a:avLst/>
@@ -7926,7 +7926,7 @@
         <p:spPr>
           <a:xfrm>
             <a:off x="8280000" y="5004000"/>
-            <a:ext cx="141840" cy="105840"/>
+            <a:ext cx="141480" cy="105480"/>
           </a:xfrm>
           <a:prstGeom prst="rect">
             <a:avLst/>
@@ -7950,7 +7950,7 @@
                 <a:spcPct val="100000"/>
               </a:lnSpc>
             </a:pPr>
-            <a:fld id="{4E3B1490-85DD-4E0C-BB71-CEA20E173028}" type="slidenum">
+            <a:fld id="{5B5057E0-B0A2-4FFF-B2E7-CD80D292CE8F}" type="slidenum">
               <a:rPr b="0" lang="en-US" sz="600" spc="-1" strike="noStrike">
                 <a:solidFill>
                   <a:srgbClr val="ffffff"/>
@@ -7975,7 +7975,7 @@
         <p:spPr>
           <a:xfrm>
             <a:off x="876240" y="778320"/>
-            <a:ext cx="6621840" cy="3885120"/>
+            <a:ext cx="6621480" cy="3884760"/>
           </a:xfrm>
           <a:prstGeom prst="rect">
             <a:avLst/>
@@ -8004,7 +8004,7 @@
             </a:endParaRPr>
           </a:p>
           <a:p>
-            <a:pPr marL="285840" indent="-283680">
+            <a:pPr marL="285840" indent="-283320">
               <a:lnSpc>
                 <a:spcPct val="120000"/>
               </a:lnSpc>
@@ -8029,7 +8029,7 @@
             </a:endParaRPr>
           </a:p>
           <a:p>
-            <a:pPr marL="285840" indent="-283680">
+            <a:pPr marL="285840" indent="-283320">
               <a:lnSpc>
                 <a:spcPct val="120000"/>
               </a:lnSpc>
@@ -8054,7 +8054,7 @@
             </a:endParaRPr>
           </a:p>
           <a:p>
-            <a:pPr marL="285840" indent="-283680">
+            <a:pPr marL="285840" indent="-283320">
               <a:lnSpc>
                 <a:spcPct val="120000"/>
               </a:lnSpc>
@@ -8079,7 +8079,7 @@
             </a:endParaRPr>
           </a:p>
           <a:p>
-            <a:pPr marL="285840" indent="-283680">
+            <a:pPr marL="285840" indent="-283320">
               <a:lnSpc>
                 <a:spcPct val="120000"/>
               </a:lnSpc>
@@ -8104,7 +8104,7 @@
             </a:endParaRPr>
           </a:p>
           <a:p>
-            <a:pPr marL="285840" indent="-283680">
+            <a:pPr marL="285840" indent="-283320">
               <a:lnSpc>
                 <a:spcPct val="120000"/>
               </a:lnSpc>
@@ -8228,7 +8228,7 @@
         <p:spPr>
           <a:xfrm>
             <a:off x="720000" y="288000"/>
-            <a:ext cx="6621840" cy="501840"/>
+            <a:ext cx="6621480" cy="501480"/>
           </a:xfrm>
           <a:prstGeom prst="rect">
             <a:avLst/>
@@ -8277,7 +8277,7 @@
         <p:spPr>
           <a:xfrm>
             <a:off x="4968000" y="5004000"/>
-            <a:ext cx="3237840" cy="105840"/>
+            <a:ext cx="3237480" cy="105480"/>
           </a:xfrm>
           <a:prstGeom prst="rect">
             <a:avLst/>
@@ -8326,7 +8326,7 @@
         <p:spPr>
           <a:xfrm>
             <a:off x="8280000" y="5004000"/>
-            <a:ext cx="141840" cy="105840"/>
+            <a:ext cx="141480" cy="105480"/>
           </a:xfrm>
           <a:prstGeom prst="rect">
             <a:avLst/>
@@ -8350,7 +8350,7 @@
                 <a:spcPct val="100000"/>
               </a:lnSpc>
             </a:pPr>
-            <a:fld id="{F72F2F97-EA1C-4692-BADC-31096DE54B13}" type="slidenum">
+            <a:fld id="{15196F25-95C0-40CB-8F39-CE0D2D816732}" type="slidenum">
               <a:rPr b="0" lang="en-US" sz="600" spc="-1" strike="noStrike">
                 <a:solidFill>
                   <a:srgbClr val="ffffff"/>
@@ -8375,7 +8375,7 @@
         <p:spPr>
           <a:xfrm>
             <a:off x="640080" y="822960"/>
-            <a:ext cx="6621840" cy="3885120"/>
+            <a:ext cx="6621480" cy="3884760"/>
           </a:xfrm>
           <a:prstGeom prst="rect">
             <a:avLst/>
@@ -8404,7 +8404,7 @@
             </a:endParaRPr>
           </a:p>
           <a:p>
-            <a:pPr marL="285840" indent="-283680">
+            <a:pPr marL="285840" indent="-283320">
               <a:lnSpc>
                 <a:spcPct val="120000"/>
               </a:lnSpc>
@@ -8429,7 +8429,7 @@
             </a:endParaRPr>
           </a:p>
           <a:p>
-            <a:pPr marL="285840" indent="-283680">
+            <a:pPr marL="285840" indent="-283320">
               <a:lnSpc>
                 <a:spcPct val="120000"/>
               </a:lnSpc>
@@ -8447,89 +8447,14 @@
                 <a:latin typeface="Arial"/>
                 <a:ea typeface="DejaVu Sans"/>
               </a:rPr>
-              <a:t>Create a function which can be called to handle requests to the back-end using `window.fetch()`.</a:t>
+              <a:t>Create a fetch function which can be called to handle requests to the back-end using `window.fetch()`.</a:t>
             </a:r>
             <a:endParaRPr b="0" lang="en-US" sz="1500" spc="-1" strike="noStrike">
               <a:latin typeface="Arial"/>
             </a:endParaRPr>
           </a:p>
           <a:p>
-            <a:pPr marL="285840" indent="-283680">
-              <a:lnSpc>
-                <a:spcPct val="120000"/>
-              </a:lnSpc>
-              <a:buClr>
-                <a:srgbClr val="000000"/>
-              </a:buClr>
-              <a:buFont typeface="Arial"/>
-              <a:buChar char="•"/>
-            </a:pPr>
-            <a:r>
-              <a:rPr b="0" lang="en-US" sz="1500" spc="-1" strike="noStrike">
-                <a:solidFill>
-                  <a:srgbClr val="000000"/>
-                </a:solidFill>
-                <a:latin typeface="Arial"/>
-                <a:ea typeface="DejaVu Sans"/>
-              </a:rPr>
-              <a:t>As an option, pass the correct headers (`accept: “application/json”`)</a:t>
-            </a:r>
-            <a:endParaRPr b="0" lang="en-US" sz="1500" spc="-1" strike="noStrike">
-              <a:latin typeface="Arial"/>
-            </a:endParaRPr>
-          </a:p>
-          <a:p>
-            <a:pPr marL="285840" indent="-283680">
-              <a:lnSpc>
-                <a:spcPct val="120000"/>
-              </a:lnSpc>
-              <a:buClr>
-                <a:srgbClr val="000000"/>
-              </a:buClr>
-              <a:buFont typeface="Arial"/>
-              <a:buChar char="•"/>
-            </a:pPr>
-            <a:r>
-              <a:rPr b="0" lang="en-US" sz="1500" spc="-1" strike="noStrike">
-                <a:solidFill>
-                  <a:srgbClr val="000000"/>
-                </a:solidFill>
-                <a:latin typeface="Arial"/>
-                <a:ea typeface="DejaVu Sans"/>
-              </a:rPr>
-              <a:t>Add error handling for response errors to this function</a:t>
-            </a:r>
-            <a:endParaRPr b="0" lang="en-US" sz="1500" spc="-1" strike="noStrike">
-              <a:latin typeface="Arial"/>
-            </a:endParaRPr>
-          </a:p>
-          <a:p>
-            <a:pPr marL="285840" indent="-283680">
-              <a:lnSpc>
-                <a:spcPct val="120000"/>
-              </a:lnSpc>
-              <a:buClr>
-                <a:srgbClr val="000000"/>
-              </a:buClr>
-              <a:buFont typeface="Arial"/>
-              <a:buChar char="•"/>
-            </a:pPr>
-            <a:r>
-              <a:rPr b="0" lang="en-US" sz="1500" spc="-1" strike="noStrike">
-                <a:solidFill>
-                  <a:srgbClr val="000000"/>
-                </a:solidFill>
-                <a:latin typeface="Arial"/>
-                <a:ea typeface="DejaVu Sans"/>
-              </a:rPr>
-              <a:t>Add error handling for network errors to this function</a:t>
-            </a:r>
-            <a:endParaRPr b="0" lang="en-US" sz="1500" spc="-1" strike="noStrike">
-              <a:latin typeface="Arial"/>
-            </a:endParaRPr>
-          </a:p>
-          <a:p>
-            <a:pPr marL="285840" indent="-283680">
+            <a:pPr marL="285840" indent="-283320">
               <a:lnSpc>
                 <a:spcPct val="120000"/>
               </a:lnSpc>
@@ -8548,6 +8473,71 @@
                 <a:ea typeface="DejaVu Sans"/>
               </a:rPr>
               <a:t>Use this function to fetch the accommodations in the lifecyclemethod `componentDidMount()` in `Accommodations.js`. Be aware this is an asynchronous process, so return `null` in the render method until the accommodations have been loaded!</a:t>
+            </a:r>
+            <a:endParaRPr b="0" lang="en-US" sz="1500" spc="-1" strike="noStrike">
+              <a:latin typeface="Arial"/>
+            </a:endParaRPr>
+          </a:p>
+          <a:p>
+            <a:pPr marL="285840" indent="-283320">
+              <a:lnSpc>
+                <a:spcPct val="120000"/>
+              </a:lnSpc>
+              <a:buClr>
+                <a:srgbClr val="000000"/>
+              </a:buClr>
+              <a:buFont typeface="Arial"/>
+              <a:buChar char="•"/>
+            </a:pPr>
+            <a:endParaRPr b="0" lang="en-US" sz="1500" spc="-1" strike="noStrike">
+              <a:latin typeface="Arial"/>
+            </a:endParaRPr>
+          </a:p>
+          <a:p>
+            <a:pPr marL="285840" indent="-283320">
+              <a:lnSpc>
+                <a:spcPct val="120000"/>
+              </a:lnSpc>
+              <a:buClr>
+                <a:srgbClr val="000000"/>
+              </a:buClr>
+              <a:buFont typeface="Arial"/>
+              <a:buChar char="•"/>
+            </a:pPr>
+            <a:r>
+              <a:rPr b="0" lang="en-US" sz="1500" spc="-1" strike="noStrike">
+                <a:solidFill>
+                  <a:srgbClr val="000000"/>
+                </a:solidFill>
+                <a:latin typeface="Arial"/>
+                <a:ea typeface="DejaVu Sans"/>
+              </a:rPr>
+              <a:t>Bonus: Add error handling for response errors to your fetch function</a:t>
+            </a:r>
+            <a:endParaRPr b="0" lang="en-US" sz="1500" spc="-1" strike="noStrike">
+              <a:latin typeface="Arial"/>
+            </a:endParaRPr>
+          </a:p>
+          <a:p>
+            <a:pPr marL="285840" indent="-283320">
+              <a:lnSpc>
+                <a:spcPct val="120000"/>
+              </a:lnSpc>
+              <a:buClr>
+                <a:srgbClr val="000000"/>
+              </a:buClr>
+              <a:buFont typeface="Arial"/>
+              <a:buChar char="•"/>
+            </a:pPr>
+            <a:r>
+              <a:rPr b="0" lang="en-US" sz="1500" spc="-1" strike="noStrike">
+                <a:solidFill>
+                  <a:srgbClr val="000000"/>
+                </a:solidFill>
+                <a:latin typeface="Arial"/>
+                <a:ea typeface="DejaVu Sans"/>
+              </a:rPr>
+              <a:t>Bonus: Add error handling for network errors to your fetch function</a:t>
             </a:r>
             <a:endParaRPr b="0" lang="en-US" sz="1500" spc="-1" strike="noStrike">
               <a:latin typeface="Arial"/>

</xml_diff>

<commit_message>
add browserHistory to slides
</commit_message>
<xml_diff>
--- a/sig2/slides/SIG react 2.pptx
+++ b/sig2/slides/SIG react 2.pptx
@@ -4059,7 +4059,7 @@
         <p:spPr>
           <a:xfrm>
             <a:off x="7200000" y="360000"/>
-            <a:ext cx="1256040" cy="283680"/>
+            <a:ext cx="1255680" cy="283320"/>
           </a:xfrm>
           <a:prstGeom prst="rect">
             <a:avLst/>
@@ -4082,7 +4082,7 @@
         <p:spPr>
           <a:xfrm>
             <a:off x="0" y="4966560"/>
-            <a:ext cx="9141120" cy="173880"/>
+            <a:ext cx="9140760" cy="173520"/>
           </a:xfrm>
           <a:prstGeom prst="rect">
             <a:avLst/>
@@ -4139,7 +4139,7 @@
         <p:spPr>
           <a:xfrm>
             <a:off x="0" y="4966560"/>
-            <a:ext cx="9141120" cy="173880"/>
+            <a:ext cx="9140760" cy="173520"/>
           </a:xfrm>
           <a:prstGeom prst="rect">
             <a:avLst/>
@@ -4162,7 +4162,7 @@
         <p:spPr>
           <a:xfrm>
             <a:off x="648000" y="108000"/>
-            <a:ext cx="2877480" cy="646200"/>
+            <a:ext cx="2877120" cy="645840"/>
           </a:xfrm>
           <a:prstGeom prst="rect">
             <a:avLst/>
@@ -4443,7 +4443,7 @@
         <p:spPr>
           <a:xfrm>
             <a:off x="7200000" y="360000"/>
-            <a:ext cx="1256040" cy="283680"/>
+            <a:ext cx="1255680" cy="283320"/>
           </a:xfrm>
           <a:prstGeom prst="rect">
             <a:avLst/>
@@ -4466,7 +4466,7 @@
         <p:spPr>
           <a:xfrm>
             <a:off x="0" y="4966560"/>
-            <a:ext cx="9141120" cy="173880"/>
+            <a:ext cx="9140760" cy="173520"/>
           </a:xfrm>
           <a:prstGeom prst="rect">
             <a:avLst/>
@@ -4781,7 +4781,7 @@
         <p:spPr>
           <a:xfrm>
             <a:off x="7200000" y="360000"/>
-            <a:ext cx="1256040" cy="283680"/>
+            <a:ext cx="1255680" cy="283320"/>
           </a:xfrm>
           <a:prstGeom prst="rect">
             <a:avLst/>
@@ -4804,7 +4804,7 @@
         <p:spPr>
           <a:xfrm>
             <a:off x="0" y="4966560"/>
-            <a:ext cx="9141120" cy="173880"/>
+            <a:ext cx="9140760" cy="173520"/>
           </a:xfrm>
           <a:prstGeom prst="rect">
             <a:avLst/>
@@ -4857,7 +4857,7 @@
         <p:spPr>
           <a:xfrm>
             <a:off x="0" y="812880"/>
-            <a:ext cx="9141120" cy="3507120"/>
+            <a:ext cx="9140760" cy="3506760"/>
           </a:xfrm>
           <a:prstGeom prst="rect">
             <a:avLst/>
@@ -5149,7 +5149,7 @@
         <p:spPr>
           <a:xfrm>
             <a:off x="0" y="810000"/>
-            <a:ext cx="9141120" cy="3345120"/>
+            <a:ext cx="9140760" cy="3344760"/>
           </a:xfrm>
           <a:prstGeom prst="rect">
             <a:avLst/>
@@ -5171,7 +5171,7 @@
         <p:spPr>
           <a:xfrm>
             <a:off x="5400000" y="1548000"/>
-            <a:ext cx="3021120" cy="3021120"/>
+            <a:ext cx="3020760" cy="3020760"/>
           </a:xfrm>
           <a:prstGeom prst="rect">
             <a:avLst/>
@@ -5282,7 +5282,7 @@
         <p:spPr>
           <a:xfrm>
             <a:off x="720000" y="288000"/>
-            <a:ext cx="6621120" cy="501120"/>
+            <a:ext cx="6620760" cy="500760"/>
           </a:xfrm>
           <a:prstGeom prst="rect">
             <a:avLst/>
@@ -5331,7 +5331,7 @@
         <p:spPr>
           <a:xfrm>
             <a:off x="4968000" y="5004000"/>
-            <a:ext cx="3237120" cy="105120"/>
+            <a:ext cx="3236760" cy="104760"/>
           </a:xfrm>
           <a:prstGeom prst="rect">
             <a:avLst/>
@@ -5380,7 +5380,7 @@
         <p:spPr>
           <a:xfrm>
             <a:off x="8280000" y="5004000"/>
-            <a:ext cx="141120" cy="105120"/>
+            <a:ext cx="140760" cy="104760"/>
           </a:xfrm>
           <a:prstGeom prst="rect">
             <a:avLst/>
@@ -5404,7 +5404,7 @@
                 <a:spcPct val="100000"/>
               </a:lnSpc>
             </a:pPr>
-            <a:fld id="{51E2A1BD-09B2-4F0B-A6CF-747868A6B629}" type="slidenum">
+            <a:fld id="{AB8FE0E9-4FFB-4223-991E-2DD492E3AFB5}" type="slidenum">
               <a:rPr b="0" lang="en-US" sz="600" spc="-1" strike="noStrike">
                 <a:solidFill>
                   <a:srgbClr val="ffffff"/>
@@ -5412,7 +5412,7 @@
                 <a:latin typeface="Arial"/>
                 <a:ea typeface="DejaVu Sans"/>
               </a:rPr>
-              <a:t>&lt;number&gt;</a:t>
+              <a:t>1</a:t>
             </a:fld>
             <a:endParaRPr b="0" lang="en-US" sz="600" spc="-1" strike="noStrike">
               <a:latin typeface="Arial"/>
@@ -5429,7 +5429,7 @@
         <p:spPr>
           <a:xfrm>
             <a:off x="640080" y="822960"/>
-            <a:ext cx="6621120" cy="3884400"/>
+            <a:ext cx="6620760" cy="3884040"/>
           </a:xfrm>
           <a:prstGeom prst="rect">
             <a:avLst/>
@@ -5458,7 +5458,7 @@
             </a:endParaRPr>
           </a:p>
           <a:p>
-            <a:pPr marL="285840" indent="-282960">
+            <a:pPr marL="285840" indent="-282600">
               <a:lnSpc>
                 <a:spcPct val="120000"/>
               </a:lnSpc>
@@ -5483,7 +5483,7 @@
             </a:endParaRPr>
           </a:p>
           <a:p>
-            <a:pPr marL="285840" indent="-282960">
+            <a:pPr marL="285840" indent="-282600">
               <a:lnSpc>
                 <a:spcPct val="120000"/>
               </a:lnSpc>
@@ -5508,7 +5508,7 @@
             </a:endParaRPr>
           </a:p>
           <a:p>
-            <a:pPr marL="285840" indent="-282960">
+            <a:pPr marL="285840" indent="-282600">
               <a:lnSpc>
                 <a:spcPct val="120000"/>
               </a:lnSpc>
@@ -5602,7 +5602,7 @@
         <p:spPr>
           <a:xfrm>
             <a:off x="720000" y="288000"/>
-            <a:ext cx="6621120" cy="501120"/>
+            <a:ext cx="6620760" cy="500760"/>
           </a:xfrm>
           <a:prstGeom prst="rect">
             <a:avLst/>
@@ -5651,7 +5651,7 @@
         <p:spPr>
           <a:xfrm>
             <a:off x="4968000" y="5004000"/>
-            <a:ext cx="3237120" cy="105120"/>
+            <a:ext cx="3236760" cy="104760"/>
           </a:xfrm>
           <a:prstGeom prst="rect">
             <a:avLst/>
@@ -5700,7 +5700,7 @@
         <p:spPr>
           <a:xfrm>
             <a:off x="8280000" y="5004000"/>
-            <a:ext cx="141120" cy="105120"/>
+            <a:ext cx="140760" cy="104760"/>
           </a:xfrm>
           <a:prstGeom prst="rect">
             <a:avLst/>
@@ -5724,7 +5724,7 @@
                 <a:spcPct val="100000"/>
               </a:lnSpc>
             </a:pPr>
-            <a:fld id="{0AC73A3B-EBC2-4F1B-AE3A-73149998175B}" type="slidenum">
+            <a:fld id="{9792DA0E-1C02-4126-853B-2C4A35832AD1}" type="slidenum">
               <a:rPr b="0" lang="en-US" sz="600" spc="-1" strike="noStrike">
                 <a:solidFill>
                   <a:srgbClr val="ffffff"/>
@@ -5732,7 +5732,7 @@
                 <a:latin typeface="Arial"/>
                 <a:ea typeface="DejaVu Sans"/>
               </a:rPr>
-              <a:t>&lt;number&gt;</a:t>
+              <a:t>1</a:t>
             </a:fld>
             <a:endParaRPr b="0" lang="en-US" sz="600" spc="-1" strike="noStrike">
               <a:latin typeface="Arial"/>
@@ -5749,7 +5749,7 @@
         <p:spPr>
           <a:xfrm>
             <a:off x="640080" y="822960"/>
-            <a:ext cx="6621120" cy="3884400"/>
+            <a:ext cx="6620760" cy="3884040"/>
           </a:xfrm>
           <a:prstGeom prst="rect">
             <a:avLst/>
@@ -5778,7 +5778,7 @@
             </a:endParaRPr>
           </a:p>
           <a:p>
-            <a:pPr marL="285840" indent="-282960">
+            <a:pPr marL="285840" indent="-282600">
               <a:lnSpc>
                 <a:spcPct val="120000"/>
               </a:lnSpc>
@@ -5803,7 +5803,7 @@
             </a:endParaRPr>
           </a:p>
           <a:p>
-            <a:pPr marL="285840" indent="-282960">
+            <a:pPr marL="285840" indent="-282600">
               <a:lnSpc>
                 <a:spcPct val="120000"/>
               </a:lnSpc>
@@ -5828,7 +5828,7 @@
             </a:endParaRPr>
           </a:p>
           <a:p>
-            <a:pPr marL="285840" indent="-282960">
+            <a:pPr marL="285840" indent="-282600">
               <a:lnSpc>
                 <a:spcPct val="120000"/>
               </a:lnSpc>
@@ -5853,7 +5853,7 @@
             </a:endParaRPr>
           </a:p>
           <a:p>
-            <a:pPr marL="285840" indent="-282960">
+            <a:pPr marL="285840" indent="-282600">
               <a:lnSpc>
                 <a:spcPct val="120000"/>
               </a:lnSpc>
@@ -5871,14 +5871,14 @@
                 <a:latin typeface="Arial"/>
                 <a:ea typeface="DejaVu Sans"/>
               </a:rPr>
-              <a:t>Add a Switch component</a:t>
+              <a:t>Import createHistory function from history/createBrowserHistory and pass it in the history prop of the router element</a:t>
             </a:r>
             <a:endParaRPr b="0" lang="en-US" sz="1500" spc="-1" strike="noStrike">
               <a:latin typeface="Arial"/>
             </a:endParaRPr>
           </a:p>
           <a:p>
-            <a:pPr marL="285840" indent="-282960">
+            <a:pPr marL="285840" indent="-282600">
               <a:lnSpc>
                 <a:spcPct val="120000"/>
               </a:lnSpc>
@@ -5896,14 +5896,14 @@
                 <a:latin typeface="Arial"/>
                 <a:ea typeface="DejaVu Sans"/>
               </a:rPr>
-              <a:t>Add a `&lt;Route …/&gt;` for path `”/”` to your accommodations component</a:t>
+              <a:t>Add a Switch component</a:t>
             </a:r>
             <a:endParaRPr b="0" lang="en-US" sz="1500" spc="-1" strike="noStrike">
               <a:latin typeface="Arial"/>
             </a:endParaRPr>
           </a:p>
           <a:p>
-            <a:pPr marL="285840" indent="-282960">
+            <a:pPr marL="285840" indent="-282600">
               <a:lnSpc>
                 <a:spcPct val="120000"/>
               </a:lnSpc>
@@ -5921,14 +5921,14 @@
                 <a:latin typeface="Arial"/>
                 <a:ea typeface="DejaVu Sans"/>
               </a:rPr>
-              <a:t>Add a route for path `”/:id”` to your accommodation detail component</a:t>
+              <a:t>Add a `&lt;Route …/&gt;` for path `”/”` to your accommodations component</a:t>
             </a:r>
             <a:endParaRPr b="0" lang="en-US" sz="1500" spc="-1" strike="noStrike">
               <a:latin typeface="Arial"/>
             </a:endParaRPr>
           </a:p>
           <a:p>
-            <a:pPr marL="285840" indent="-282960">
+            <a:pPr marL="285840" indent="-282600">
               <a:lnSpc>
                 <a:spcPct val="120000"/>
               </a:lnSpc>
@@ -5946,14 +5946,14 @@
                 <a:latin typeface="Arial"/>
                 <a:ea typeface="DejaVu Sans"/>
               </a:rPr>
-              <a:t>Add a route for path `”*”` to your 404 component</a:t>
+              <a:t>Add a route for path `”/:id”` to your accommodation detail component</a:t>
             </a:r>
             <a:endParaRPr b="0" lang="en-US" sz="1500" spc="-1" strike="noStrike">
               <a:latin typeface="Arial"/>
             </a:endParaRPr>
           </a:p>
           <a:p>
-            <a:pPr marL="285840" indent="-282960">
+            <a:pPr marL="285840" indent="-282600">
               <a:lnSpc>
                 <a:spcPct val="120000"/>
               </a:lnSpc>
@@ -5963,12 +5963,32 @@
               <a:buFont typeface="Arial"/>
               <a:buChar char="•"/>
             </a:pPr>
+            <a:r>
+              <a:rPr b="0" lang="en-US" sz="1500" spc="-1" strike="noStrike">
+                <a:solidFill>
+                  <a:srgbClr val="000000"/>
+                </a:solidFill>
+                <a:latin typeface="Arial"/>
+                <a:ea typeface="DejaVu Sans"/>
+              </a:rPr>
+              <a:t>Add a route for path `”*”` to your 404 component</a:t>
+            </a:r>
             <a:endParaRPr b="0" lang="en-US" sz="1500" spc="-1" strike="noStrike">
               <a:latin typeface="Arial"/>
             </a:endParaRPr>
           </a:p>
           <a:p>
-            <a:pPr marL="285840" indent="-282960">
+            <a:pPr>
+              <a:lnSpc>
+                <a:spcPct val="120000"/>
+              </a:lnSpc>
+            </a:pPr>
+            <a:endParaRPr b="0" lang="en-US" sz="1500" spc="-1" strike="noStrike">
+              <a:latin typeface="Arial"/>
+            </a:endParaRPr>
+          </a:p>
+          <a:p>
+            <a:pPr marL="285840" indent="-282600">
               <a:lnSpc>
                 <a:spcPct val="120000"/>
               </a:lnSpc>
@@ -5993,30 +6013,20 @@
             </a:endParaRPr>
           </a:p>
           <a:p>
-            <a:pPr marL="285840" indent="-282960">
+            <a:pPr>
               <a:lnSpc>
                 <a:spcPct val="120000"/>
               </a:lnSpc>
-              <a:buClr>
-                <a:srgbClr val="000000"/>
-              </a:buClr>
-              <a:buFont typeface="Arial"/>
-              <a:buChar char="•"/>
             </a:pPr>
             <a:endParaRPr b="0" lang="en-US" sz="1500" spc="-1" strike="noStrike">
               <a:latin typeface="Arial"/>
             </a:endParaRPr>
           </a:p>
           <a:p>
-            <a:pPr marL="285840" indent="-282960">
+            <a:pPr>
               <a:lnSpc>
                 <a:spcPct val="120000"/>
               </a:lnSpc>
-              <a:buClr>
-                <a:srgbClr val="000000"/>
-              </a:buClr>
-              <a:buFont typeface="Arial"/>
-              <a:buChar char="•"/>
             </a:pPr>
             <a:endParaRPr b="0" lang="en-US" sz="1500" spc="-1" strike="noStrike">
               <a:latin typeface="Arial"/>
@@ -6082,7 +6092,7 @@
         <p:spPr>
           <a:xfrm>
             <a:off x="720000" y="288000"/>
-            <a:ext cx="6621120" cy="501120"/>
+            <a:ext cx="6620760" cy="500760"/>
           </a:xfrm>
           <a:prstGeom prst="rect">
             <a:avLst/>
@@ -6131,7 +6141,7 @@
         <p:spPr>
           <a:xfrm>
             <a:off x="4968000" y="5004000"/>
-            <a:ext cx="3237120" cy="105120"/>
+            <a:ext cx="3236760" cy="104760"/>
           </a:xfrm>
           <a:prstGeom prst="rect">
             <a:avLst/>
@@ -6180,7 +6190,7 @@
         <p:spPr>
           <a:xfrm>
             <a:off x="8280000" y="5004000"/>
-            <a:ext cx="141120" cy="105120"/>
+            <a:ext cx="140760" cy="104760"/>
           </a:xfrm>
           <a:prstGeom prst="rect">
             <a:avLst/>
@@ -6204,7 +6214,7 @@
                 <a:spcPct val="100000"/>
               </a:lnSpc>
             </a:pPr>
-            <a:fld id="{360B960C-B1BF-4A5A-B963-7CC1A415C9DC}" type="slidenum">
+            <a:fld id="{11EDDBC2-666D-4829-94FD-B6C3967F3E29}" type="slidenum">
               <a:rPr b="0" lang="en-US" sz="600" spc="-1" strike="noStrike">
                 <a:solidFill>
                   <a:srgbClr val="ffffff"/>
@@ -6212,7 +6222,7 @@
                 <a:latin typeface="Arial"/>
                 <a:ea typeface="DejaVu Sans"/>
               </a:rPr>
-              <a:t>&lt;number&gt;</a:t>
+              <a:t>1</a:t>
             </a:fld>
             <a:endParaRPr b="0" lang="en-US" sz="600" spc="-1" strike="noStrike">
               <a:latin typeface="Arial"/>
@@ -6229,7 +6239,7 @@
         <p:spPr>
           <a:xfrm>
             <a:off x="601560" y="822960"/>
-            <a:ext cx="6621120" cy="3884400"/>
+            <a:ext cx="6620760" cy="3884040"/>
           </a:xfrm>
           <a:prstGeom prst="rect">
             <a:avLst/>
@@ -6258,7 +6268,7 @@
             </a:endParaRPr>
           </a:p>
           <a:p>
-            <a:pPr marL="285840" indent="-282960">
+            <a:pPr marL="285840" indent="-282600">
               <a:lnSpc>
                 <a:spcPct val="120000"/>
               </a:lnSpc>
@@ -6283,7 +6293,27 @@
             </a:endParaRPr>
           </a:p>
           <a:p>
-            <a:pPr marL="285840" indent="-282960">
+            <a:pPr>
+              <a:lnSpc>
+                <a:spcPct val="120000"/>
+              </a:lnSpc>
+            </a:pPr>
+            <a:endParaRPr b="0" lang="en-US" sz="1500" spc="-1" strike="noStrike">
+              <a:latin typeface="Arial"/>
+            </a:endParaRPr>
+          </a:p>
+          <a:p>
+            <a:pPr>
+              <a:lnSpc>
+                <a:spcPct val="120000"/>
+              </a:lnSpc>
+            </a:pPr>
+            <a:endParaRPr b="0" lang="en-US" sz="1500" spc="-1" strike="noStrike">
+              <a:latin typeface="Arial"/>
+            </a:endParaRPr>
+          </a:p>
+          <a:p>
+            <a:pPr marL="285840" indent="-282600">
               <a:lnSpc>
                 <a:spcPct val="120000"/>
               </a:lnSpc>
@@ -6293,36 +6323,6 @@
               <a:buFont typeface="Arial"/>
               <a:buChar char="•"/>
             </a:pPr>
-            <a:endParaRPr b="0" lang="en-US" sz="1500" spc="-1" strike="noStrike">
-              <a:latin typeface="Arial"/>
-            </a:endParaRPr>
-          </a:p>
-          <a:p>
-            <a:pPr marL="285840" indent="-282960">
-              <a:lnSpc>
-                <a:spcPct val="120000"/>
-              </a:lnSpc>
-              <a:buClr>
-                <a:srgbClr val="000000"/>
-              </a:buClr>
-              <a:buFont typeface="Arial"/>
-              <a:buChar char="•"/>
-            </a:pPr>
-            <a:endParaRPr b="0" lang="en-US" sz="1500" spc="-1" strike="noStrike">
-              <a:latin typeface="Arial"/>
-            </a:endParaRPr>
-          </a:p>
-          <a:p>
-            <a:pPr marL="285840" indent="-282960">
-              <a:lnSpc>
-                <a:spcPct val="120000"/>
-              </a:lnSpc>
-              <a:buClr>
-                <a:srgbClr val="000000"/>
-              </a:buClr>
-              <a:buFont typeface="Arial"/>
-              <a:buChar char="•"/>
-            </a:pPr>
             <a:r>
               <a:rPr b="0" lang="en-US" sz="1500" spc="-1" strike="noStrike">
                 <a:solidFill>
@@ -6338,37 +6338,27 @@
             </a:endParaRPr>
           </a:p>
           <a:p>
-            <a:pPr marL="285840" indent="-282960">
+            <a:pPr>
               <a:lnSpc>
                 <a:spcPct val="120000"/>
               </a:lnSpc>
-              <a:buClr>
-                <a:srgbClr val="000000"/>
-              </a:buClr>
-              <a:buFont typeface="Arial"/>
-              <a:buChar char="•"/>
             </a:pPr>
             <a:endParaRPr b="0" lang="en-US" sz="1500" spc="-1" strike="noStrike">
               <a:latin typeface="Arial"/>
             </a:endParaRPr>
           </a:p>
           <a:p>
-            <a:pPr marL="285840" indent="-282960">
+            <a:pPr>
               <a:lnSpc>
                 <a:spcPct val="120000"/>
               </a:lnSpc>
-              <a:buClr>
-                <a:srgbClr val="000000"/>
-              </a:buClr>
-              <a:buFont typeface="Arial"/>
-              <a:buChar char="•"/>
             </a:pPr>
             <a:endParaRPr b="0" lang="en-US" sz="1500" spc="-1" strike="noStrike">
               <a:latin typeface="Arial"/>
             </a:endParaRPr>
           </a:p>
           <a:p>
-            <a:pPr marL="285840" indent="-282960">
+            <a:pPr marL="285840" indent="-282600">
               <a:lnSpc>
                 <a:spcPct val="120000"/>
               </a:lnSpc>
@@ -6417,7 +6407,7 @@
         <p:spPr>
           <a:xfrm>
             <a:off x="5394960" y="939600"/>
-            <a:ext cx="1780920" cy="980640"/>
+            <a:ext cx="1780560" cy="980280"/>
           </a:xfrm>
           <a:prstGeom prst="rect">
             <a:avLst/>
@@ -6440,7 +6430,7 @@
         <p:spPr>
           <a:xfrm>
             <a:off x="5429520" y="2817720"/>
-            <a:ext cx="2800080" cy="199800"/>
+            <a:ext cx="2799720" cy="199440"/>
           </a:xfrm>
           <a:prstGeom prst="rect">
             <a:avLst/>
@@ -6463,7 +6453,7 @@
         <p:spPr>
           <a:xfrm>
             <a:off x="5394960" y="1920240"/>
-            <a:ext cx="3057120" cy="437760"/>
+            <a:ext cx="3056760" cy="437400"/>
           </a:xfrm>
           <a:prstGeom prst="rect">
             <a:avLst/>
@@ -6531,7 +6521,7 @@
         <p:spPr>
           <a:xfrm>
             <a:off x="720000" y="288000"/>
-            <a:ext cx="6621120" cy="501120"/>
+            <a:ext cx="6620760" cy="500760"/>
           </a:xfrm>
           <a:prstGeom prst="rect">
             <a:avLst/>
@@ -6580,7 +6570,7 @@
         <p:spPr>
           <a:xfrm>
             <a:off x="4968000" y="5004000"/>
-            <a:ext cx="3237120" cy="105120"/>
+            <a:ext cx="3236760" cy="104760"/>
           </a:xfrm>
           <a:prstGeom prst="rect">
             <a:avLst/>
@@ -6629,7 +6619,7 @@
         <p:spPr>
           <a:xfrm>
             <a:off x="8280000" y="5004000"/>
-            <a:ext cx="141120" cy="105120"/>
+            <a:ext cx="140760" cy="104760"/>
           </a:xfrm>
           <a:prstGeom prst="rect">
             <a:avLst/>
@@ -6653,7 +6643,7 @@
                 <a:spcPct val="100000"/>
               </a:lnSpc>
             </a:pPr>
-            <a:fld id="{E2059D6F-8486-4FB4-BF31-727DC6FBC308}" type="slidenum">
+            <a:fld id="{41414F70-E12C-4014-99BD-D07DAA1BEA43}" type="slidenum">
               <a:rPr b="0" lang="en-US" sz="600" spc="-1" strike="noStrike">
                 <a:solidFill>
                   <a:srgbClr val="ffffff"/>
@@ -6678,7 +6668,7 @@
         <p:spPr>
           <a:xfrm>
             <a:off x="601560" y="822960"/>
-            <a:ext cx="6621120" cy="3884400"/>
+            <a:ext cx="6620760" cy="3884040"/>
           </a:xfrm>
           <a:prstGeom prst="rect">
             <a:avLst/>
@@ -6737,7 +6727,7 @@
             </a:endParaRPr>
           </a:p>
           <a:p>
-            <a:pPr marL="285840" indent="-282960">
+            <a:pPr marL="285840" indent="-282600">
               <a:lnSpc>
                 <a:spcPct val="120000"/>
               </a:lnSpc>
@@ -6762,7 +6752,7 @@
             </a:endParaRPr>
           </a:p>
           <a:p>
-            <a:pPr marL="285840" indent="-282960">
+            <a:pPr marL="285840" indent="-282600">
               <a:lnSpc>
                 <a:spcPct val="120000"/>
               </a:lnSpc>
@@ -6787,7 +6777,7 @@
             </a:endParaRPr>
           </a:p>
           <a:p>
-            <a:pPr marL="285840" indent="-282960">
+            <a:pPr marL="285840" indent="-282600">
               <a:lnSpc>
                 <a:spcPct val="120000"/>
               </a:lnSpc>
@@ -6812,7 +6802,7 @@
             </a:endParaRPr>
           </a:p>
           <a:p>
-            <a:pPr marL="285840" indent="-282960">
+            <a:pPr marL="285840" indent="-282600">
               <a:lnSpc>
                 <a:spcPct val="120000"/>
               </a:lnSpc>
@@ -6896,7 +6886,7 @@
         <p:spPr>
           <a:xfrm>
             <a:off x="720000" y="288000"/>
-            <a:ext cx="6621120" cy="501120"/>
+            <a:ext cx="6620760" cy="500760"/>
           </a:xfrm>
           <a:prstGeom prst="rect">
             <a:avLst/>
@@ -6945,7 +6935,7 @@
         <p:spPr>
           <a:xfrm>
             <a:off x="4968000" y="5004000"/>
-            <a:ext cx="3237120" cy="105120"/>
+            <a:ext cx="3236760" cy="104760"/>
           </a:xfrm>
           <a:prstGeom prst="rect">
             <a:avLst/>
@@ -6994,7 +6984,7 @@
         <p:spPr>
           <a:xfrm>
             <a:off x="8280000" y="5004000"/>
-            <a:ext cx="141120" cy="105120"/>
+            <a:ext cx="140760" cy="104760"/>
           </a:xfrm>
           <a:prstGeom prst="rect">
             <a:avLst/>
@@ -7018,7 +7008,7 @@
                 <a:spcPct val="100000"/>
               </a:lnSpc>
             </a:pPr>
-            <a:fld id="{EF69D8B4-E9B9-469C-BFE6-EEEB3D63A40F}" type="slidenum">
+            <a:fld id="{09C55BB2-193D-4A54-B695-FB9F5D9D6964}" type="slidenum">
               <a:rPr b="0" lang="en-US" sz="600" spc="-1" strike="noStrike">
                 <a:solidFill>
                   <a:srgbClr val="ffffff"/>
@@ -7047,7 +7037,7 @@
         <p:spPr>
           <a:xfrm>
             <a:off x="9720" y="1179000"/>
-            <a:ext cx="9143640" cy="3103560"/>
+            <a:ext cx="9143280" cy="3103200"/>
           </a:xfrm>
           <a:prstGeom prst="rect">
             <a:avLst/>
@@ -7115,7 +7105,7 @@
         <p:spPr>
           <a:xfrm>
             <a:off x="720000" y="288000"/>
-            <a:ext cx="6621120" cy="501120"/>
+            <a:ext cx="6620760" cy="500760"/>
           </a:xfrm>
           <a:prstGeom prst="rect">
             <a:avLst/>
@@ -7164,7 +7154,7 @@
         <p:spPr>
           <a:xfrm>
             <a:off x="4968000" y="5004000"/>
-            <a:ext cx="3237120" cy="105120"/>
+            <a:ext cx="3236760" cy="104760"/>
           </a:xfrm>
           <a:prstGeom prst="rect">
             <a:avLst/>
@@ -7213,7 +7203,7 @@
         <p:spPr>
           <a:xfrm>
             <a:off x="8280000" y="5004000"/>
-            <a:ext cx="141120" cy="105120"/>
+            <a:ext cx="140760" cy="104760"/>
           </a:xfrm>
           <a:prstGeom prst="rect">
             <a:avLst/>
@@ -7237,7 +7227,7 @@
                 <a:spcPct val="100000"/>
               </a:lnSpc>
             </a:pPr>
-            <a:fld id="{55BC472B-EC9F-42C7-896D-A2F88D5E28CD}" type="slidenum">
+            <a:fld id="{F213E286-C769-46A0-BB40-F5B98EFCAA92}" type="slidenum">
               <a:rPr b="0" lang="en-US" sz="600" spc="-1" strike="noStrike">
                 <a:solidFill>
                   <a:srgbClr val="ffffff"/>
@@ -7262,7 +7252,7 @@
         <p:spPr>
           <a:xfrm>
             <a:off x="876240" y="548640"/>
-            <a:ext cx="6621120" cy="3884400"/>
+            <a:ext cx="6620760" cy="3884040"/>
           </a:xfrm>
           <a:prstGeom prst="rect">
             <a:avLst/>
@@ -7291,7 +7281,7 @@
             </a:endParaRPr>
           </a:p>
           <a:p>
-            <a:pPr marL="285840" indent="-282960">
+            <a:pPr marL="285840" indent="-282600">
               <a:lnSpc>
                 <a:spcPct val="120000"/>
               </a:lnSpc>
@@ -7316,30 +7306,20 @@
             </a:endParaRPr>
           </a:p>
           <a:p>
-            <a:pPr marL="285840" indent="-282960">
+            <a:pPr>
               <a:lnSpc>
                 <a:spcPct val="120000"/>
               </a:lnSpc>
-              <a:buClr>
-                <a:srgbClr val="000000"/>
-              </a:buClr>
-              <a:buFont typeface="Arial"/>
-              <a:buChar char="•"/>
             </a:pPr>
             <a:endParaRPr b="0" lang="en-US" sz="1500" spc="-1" strike="noStrike">
               <a:latin typeface="Arial"/>
             </a:endParaRPr>
           </a:p>
           <a:p>
-            <a:pPr marL="285840" indent="-282960">
+            <a:pPr>
               <a:lnSpc>
                 <a:spcPct val="120000"/>
               </a:lnSpc>
-              <a:buClr>
-                <a:srgbClr val="000000"/>
-              </a:buClr>
-              <a:buFont typeface="Arial"/>
-              <a:buChar char="•"/>
             </a:pPr>
             <a:endParaRPr b="0" lang="en-US" sz="1500" spc="-1" strike="noStrike">
               <a:latin typeface="Arial"/>
@@ -7370,7 +7350,7 @@
         <p:spPr>
           <a:xfrm>
             <a:off x="1737360" y="2314440"/>
-            <a:ext cx="4219200" cy="380520"/>
+            <a:ext cx="4218840" cy="380160"/>
           </a:xfrm>
           <a:prstGeom prst="rect">
             <a:avLst/>
@@ -7466,14 +7446,14 @@
       </p:sp>
       <p:sp>
         <p:nvSpPr>
-          <p:cNvPr id="140" name="TextShape 8"/>
-          <p:cNvSpPr txBox="1"/>
+          <p:cNvPr id="140" name="CustomShape 8"/>
+          <p:cNvSpPr/>
           <p:nvPr/>
         </p:nvSpPr>
         <p:spPr>
           <a:xfrm>
             <a:off x="0" y="1276560"/>
-            <a:ext cx="2651760" cy="735120"/>
+            <a:ext cx="2651400" cy="734760"/>
           </a:xfrm>
           <a:prstGeom prst="rect">
             <a:avLst/>
@@ -7483,9 +7463,20 @@
             <a:noFill/>
           </a:ln>
         </p:spPr>
+        <p:style>
+          <a:lnRef idx="0"/>
+          <a:fillRef idx="0"/>
+          <a:effectRef idx="0"/>
+          <a:fontRef idx="minor"/>
+        </p:style>
         <p:txBody>
           <a:bodyPr lIns="90000" rIns="90000" tIns="45000" bIns="45000"/>
           <a:p>
+            <a:pPr>
+              <a:lnSpc>
+                <a:spcPct val="100000"/>
+              </a:lnSpc>
+            </a:pPr>
             <a:r>
               <a:rPr b="0" lang="en-US" sz="1800" spc="-1" strike="noStrike">
                 <a:latin typeface="Arial"/>
@@ -7497,6 +7488,11 @@
             </a:endParaRPr>
           </a:p>
           <a:p>
+            <a:pPr>
+              <a:lnSpc>
+                <a:spcPct val="100000"/>
+              </a:lnSpc>
+            </a:pPr>
             <a:r>
               <a:rPr b="0" lang="en-US" sz="1800" spc="-1" strike="noStrike">
                 <a:latin typeface="Arial"/>
@@ -7539,14 +7535,14 @@
       </p:sp>
       <p:sp>
         <p:nvSpPr>
-          <p:cNvPr id="142" name="TextShape 10"/>
-          <p:cNvSpPr txBox="1"/>
+          <p:cNvPr id="142" name="CustomShape 10"/>
+          <p:cNvSpPr/>
           <p:nvPr/>
         </p:nvSpPr>
         <p:spPr>
           <a:xfrm>
             <a:off x="1920240" y="3383280"/>
-            <a:ext cx="1828800" cy="1164960"/>
+            <a:ext cx="1828440" cy="1164600"/>
           </a:xfrm>
           <a:prstGeom prst="rect">
             <a:avLst/>
@@ -7556,9 +7552,20 @@
             <a:noFill/>
           </a:ln>
         </p:spPr>
+        <p:style>
+          <a:lnRef idx="0"/>
+          <a:fillRef idx="0"/>
+          <a:effectRef idx="0"/>
+          <a:fontRef idx="minor"/>
+        </p:style>
         <p:txBody>
           <a:bodyPr lIns="90000" rIns="90000" tIns="45000" bIns="45000"/>
           <a:p>
+            <a:pPr>
+              <a:lnSpc>
+                <a:spcPct val="100000"/>
+              </a:lnSpc>
+            </a:pPr>
             <a:r>
               <a:rPr b="0" lang="en-US" sz="1800" spc="-1" strike="noStrike">
                 <a:latin typeface="Arial"/>
@@ -7570,6 +7577,11 @@
             </a:endParaRPr>
           </a:p>
           <a:p>
+            <a:pPr>
+              <a:lnSpc>
+                <a:spcPct val="100000"/>
+              </a:lnSpc>
+            </a:pPr>
             <a:r>
               <a:rPr b="0" lang="en-US" sz="1800" spc="-1" strike="noStrike">
                 <a:latin typeface="Arial"/>
@@ -7587,6 +7599,11 @@
             </a:endParaRPr>
           </a:p>
           <a:p>
+            <a:pPr>
+              <a:lnSpc>
+                <a:spcPct val="100000"/>
+              </a:lnSpc>
+            </a:pPr>
             <a:r>
               <a:rPr b="0" lang="en-US" sz="1800" spc="-1" strike="noStrike">
                 <a:latin typeface="Arial"/>
@@ -7604,6 +7621,11 @@
             </a:endParaRPr>
           </a:p>
           <a:p>
+            <a:pPr>
+              <a:lnSpc>
+                <a:spcPct val="100000"/>
+              </a:lnSpc>
+            </a:pPr>
             <a:r>
               <a:rPr b="0" lang="en-US" sz="1800" spc="-1" strike="noStrike">
                 <a:latin typeface="Arial"/>
@@ -7621,6 +7643,11 @@
             </a:endParaRPr>
           </a:p>
           <a:p>
+            <a:pPr>
+              <a:lnSpc>
+                <a:spcPct val="100000"/>
+              </a:lnSpc>
+            </a:pPr>
             <a:r>
               <a:rPr b="0" lang="en-US" sz="1800" spc="-1" strike="noStrike">
                 <a:latin typeface="Arial"/>
@@ -7635,14 +7662,14 @@
       </p:sp>
       <p:sp>
         <p:nvSpPr>
-          <p:cNvPr id="143" name="TextShape 11"/>
-          <p:cNvSpPr txBox="1"/>
+          <p:cNvPr id="143" name="CustomShape 11"/>
+          <p:cNvSpPr/>
           <p:nvPr/>
         </p:nvSpPr>
         <p:spPr>
           <a:xfrm>
             <a:off x="4297680" y="3352320"/>
-            <a:ext cx="1554480" cy="305280"/>
+            <a:ext cx="1554120" cy="304920"/>
           </a:xfrm>
           <a:prstGeom prst="rect">
             <a:avLst/>
@@ -7652,9 +7679,20 @@
             <a:noFill/>
           </a:ln>
         </p:spPr>
+        <p:style>
+          <a:lnRef idx="0"/>
+          <a:fillRef idx="0"/>
+          <a:effectRef idx="0"/>
+          <a:fontRef idx="minor"/>
+        </p:style>
         <p:txBody>
           <a:bodyPr lIns="90000" rIns="90000" tIns="45000" bIns="45000"/>
           <a:p>
+            <a:pPr>
+              <a:lnSpc>
+                <a:spcPct val="100000"/>
+              </a:lnSpc>
+            </a:pPr>
             <a:r>
               <a:rPr b="0" lang="en-US" sz="1800" spc="-1" strike="noStrike">
                 <a:latin typeface="Arial"/>
@@ -7669,14 +7707,14 @@
       </p:sp>
       <p:sp>
         <p:nvSpPr>
-          <p:cNvPr id="144" name="TextShape 12"/>
-          <p:cNvSpPr txBox="1"/>
+          <p:cNvPr id="144" name="CustomShape 12"/>
+          <p:cNvSpPr/>
           <p:nvPr/>
         </p:nvSpPr>
         <p:spPr>
           <a:xfrm>
             <a:off x="5852160" y="1066320"/>
-            <a:ext cx="2286000" cy="520200"/>
+            <a:ext cx="2285640" cy="519840"/>
           </a:xfrm>
           <a:prstGeom prst="rect">
             <a:avLst/>
@@ -7686,9 +7724,20 @@
             <a:noFill/>
           </a:ln>
         </p:spPr>
+        <p:style>
+          <a:lnRef idx="0"/>
+          <a:fillRef idx="0"/>
+          <a:effectRef idx="0"/>
+          <a:fontRef idx="minor"/>
+        </p:style>
         <p:txBody>
           <a:bodyPr lIns="90000" rIns="90000" tIns="45000" bIns="45000"/>
           <a:p>
+            <a:pPr>
+              <a:lnSpc>
+                <a:spcPct val="100000"/>
+              </a:lnSpc>
+            </a:pPr>
             <a:r>
               <a:rPr b="0" lang="en-US" sz="1800" spc="-1" strike="noStrike">
                 <a:latin typeface="Arial"/>
@@ -7759,7 +7808,7 @@
         <p:spPr>
           <a:xfrm>
             <a:off x="720000" y="288000"/>
-            <a:ext cx="6621120" cy="501120"/>
+            <a:ext cx="6620760" cy="500760"/>
           </a:xfrm>
           <a:prstGeom prst="rect">
             <a:avLst/>
@@ -7808,7 +7857,7 @@
         <p:spPr>
           <a:xfrm>
             <a:off x="4968000" y="5004000"/>
-            <a:ext cx="3237120" cy="105120"/>
+            <a:ext cx="3236760" cy="104760"/>
           </a:xfrm>
           <a:prstGeom prst="rect">
             <a:avLst/>
@@ -7857,7 +7906,7 @@
         <p:spPr>
           <a:xfrm>
             <a:off x="8280000" y="5004000"/>
-            <a:ext cx="141120" cy="105120"/>
+            <a:ext cx="140760" cy="104760"/>
           </a:xfrm>
           <a:prstGeom prst="rect">
             <a:avLst/>
@@ -7881,7 +7930,7 @@
                 <a:spcPct val="100000"/>
               </a:lnSpc>
             </a:pPr>
-            <a:fld id="{B95735DC-649E-453C-8226-A69B8DE45B41}" type="slidenum">
+            <a:fld id="{08BFC5F9-84E3-4CCC-AAD4-C5FDB34BF3F3}" type="slidenum">
               <a:rPr b="0" lang="en-US" sz="600" spc="-1" strike="noStrike">
                 <a:solidFill>
                   <a:srgbClr val="ffffff"/>
@@ -7906,7 +7955,7 @@
         <p:spPr>
           <a:xfrm>
             <a:off x="876240" y="548640"/>
-            <a:ext cx="6621120" cy="3884400"/>
+            <a:ext cx="6620760" cy="3884040"/>
           </a:xfrm>
           <a:prstGeom prst="rect">
             <a:avLst/>
@@ -7935,7 +7984,7 @@
             </a:endParaRPr>
           </a:p>
           <a:p>
-            <a:pPr marL="285840" indent="-282960">
+            <a:pPr marL="285840" indent="-282600">
               <a:lnSpc>
                 <a:spcPct val="120000"/>
               </a:lnSpc>
@@ -7960,15 +8009,10 @@
             </a:endParaRPr>
           </a:p>
           <a:p>
-            <a:pPr marL="285840" indent="-282960">
+            <a:pPr>
               <a:lnSpc>
                 <a:spcPct val="120000"/>
               </a:lnSpc>
-              <a:buClr>
-                <a:srgbClr val="000000"/>
-              </a:buClr>
-              <a:buFont typeface="Arial"/>
-              <a:buChar char="•"/>
             </a:pPr>
             <a:endParaRPr b="0" lang="en-US" sz="1500" spc="-1" strike="noStrike">
               <a:latin typeface="Arial"/>
@@ -8009,7 +8053,7 @@
         <p:spPr>
           <a:xfrm>
             <a:off x="1920600" y="2602800"/>
-            <a:ext cx="3362400" cy="963360"/>
+            <a:ext cx="3362040" cy="963000"/>
           </a:xfrm>
           <a:prstGeom prst="rect">
             <a:avLst/>
@@ -8032,7 +8076,7 @@
         <p:spPr>
           <a:xfrm>
             <a:off x="1922760" y="1737360"/>
-            <a:ext cx="3023640" cy="259920"/>
+            <a:ext cx="3023280" cy="259560"/>
           </a:xfrm>
           <a:prstGeom prst="rect">
             <a:avLst/>
@@ -8055,7 +8099,7 @@
         <p:spPr>
           <a:xfrm>
             <a:off x="1927800" y="2227680"/>
-            <a:ext cx="3467160" cy="455400"/>
+            <a:ext cx="3466800" cy="455040"/>
           </a:xfrm>
           <a:prstGeom prst="rect">
             <a:avLst/>
@@ -8067,14 +8111,14 @@
       </p:pic>
       <p:sp>
         <p:nvSpPr>
-          <p:cNvPr id="152" name="TextShape 5"/>
-          <p:cNvSpPr txBox="1"/>
+          <p:cNvPr id="152" name="CustomShape 5"/>
+          <p:cNvSpPr/>
           <p:nvPr/>
         </p:nvSpPr>
         <p:spPr>
           <a:xfrm>
             <a:off x="4663440" y="4357800"/>
-            <a:ext cx="4114080" cy="305640"/>
+            <a:ext cx="4113720" cy="305280"/>
           </a:xfrm>
           <a:prstGeom prst="rect">
             <a:avLst/>
@@ -8084,9 +8128,20 @@
             <a:noFill/>
           </a:ln>
         </p:spPr>
+        <p:style>
+          <a:lnRef idx="0"/>
+          <a:fillRef idx="0"/>
+          <a:effectRef idx="0"/>
+          <a:fontRef idx="minor"/>
+        </p:style>
         <p:txBody>
           <a:bodyPr lIns="90000" rIns="90000" tIns="45000" bIns="45000"/>
           <a:p>
+            <a:pPr>
+              <a:lnSpc>
+                <a:spcPct val="100000"/>
+              </a:lnSpc>
+            </a:pPr>
             <a:r>
               <a:rPr b="0" lang="en-US" sz="1800" spc="-1" strike="noStrike">
                 <a:latin typeface="Arial"/>
@@ -8157,7 +8212,7 @@
         <p:spPr>
           <a:xfrm>
             <a:off x="720000" y="288000"/>
-            <a:ext cx="6621120" cy="501120"/>
+            <a:ext cx="6620760" cy="500760"/>
           </a:xfrm>
           <a:prstGeom prst="rect">
             <a:avLst/>
@@ -8206,7 +8261,7 @@
         <p:spPr>
           <a:xfrm>
             <a:off x="4968000" y="5004000"/>
-            <a:ext cx="3237120" cy="105120"/>
+            <a:ext cx="3236760" cy="104760"/>
           </a:xfrm>
           <a:prstGeom prst="rect">
             <a:avLst/>
@@ -8255,7 +8310,7 @@
         <p:spPr>
           <a:xfrm>
             <a:off x="8280000" y="5004000"/>
-            <a:ext cx="141120" cy="105120"/>
+            <a:ext cx="140760" cy="104760"/>
           </a:xfrm>
           <a:prstGeom prst="rect">
             <a:avLst/>
@@ -8279,7 +8334,7 @@
                 <a:spcPct val="100000"/>
               </a:lnSpc>
             </a:pPr>
-            <a:fld id="{B9B59A02-D775-4ECB-BFD2-9E78C2BAB5B1}" type="slidenum">
+            <a:fld id="{A751B332-276B-49F0-ABD5-5477911B3948}" type="slidenum">
               <a:rPr b="0" lang="en-US" sz="600" spc="-1" strike="noStrike">
                 <a:solidFill>
                   <a:srgbClr val="ffffff"/>
@@ -8304,7 +8359,7 @@
         <p:spPr>
           <a:xfrm>
             <a:off x="602640" y="504720"/>
-            <a:ext cx="6621120" cy="3884400"/>
+            <a:ext cx="6620760" cy="3884040"/>
           </a:xfrm>
           <a:prstGeom prst="rect">
             <a:avLst/>
@@ -8333,7 +8388,7 @@
             </a:endParaRPr>
           </a:p>
           <a:p>
-            <a:pPr marL="285840" indent="-282960">
+            <a:pPr marL="285840" indent="-282600">
               <a:lnSpc>
                 <a:spcPct val="120000"/>
               </a:lnSpc>
@@ -8351,264 +8406,24 @@
                 <a:latin typeface="Arial"/>
                 <a:ea typeface="DejaVu Sans"/>
               </a:rPr>
-              <a:t>P</a:t>
-            </a:r>
-            <a:r>
-              <a:rPr b="0" lang="en-US" sz="1500" spc="-1" strike="noStrike">
-                <a:solidFill>
-                  <a:srgbClr val="000000"/>
-                </a:solidFill>
-                <a:latin typeface="Arial"/>
-                <a:ea typeface="DejaVu Sans"/>
-              </a:rPr>
-              <a:t>a</a:t>
-            </a:r>
-            <a:r>
-              <a:rPr b="0" lang="en-US" sz="1500" spc="-1" strike="noStrike">
-                <a:solidFill>
-                  <a:srgbClr val="000000"/>
-                </a:solidFill>
-                <a:latin typeface="Arial"/>
-                <a:ea typeface="DejaVu Sans"/>
-              </a:rPr>
-              <a:t>c</a:t>
-            </a:r>
-            <a:r>
-              <a:rPr b="0" lang="en-US" sz="1500" spc="-1" strike="noStrike">
-                <a:solidFill>
-                  <a:srgbClr val="000000"/>
-                </a:solidFill>
-                <a:latin typeface="Arial"/>
-                <a:ea typeface="DejaVu Sans"/>
-              </a:rPr>
-              <a:t>k</a:t>
-            </a:r>
-            <a:r>
-              <a:rPr b="0" lang="en-US" sz="1500" spc="-1" strike="noStrike">
-                <a:solidFill>
-                  <a:srgbClr val="000000"/>
-                </a:solidFill>
-                <a:latin typeface="Arial"/>
-                <a:ea typeface="DejaVu Sans"/>
-              </a:rPr>
-              <a:t>a</a:t>
-            </a:r>
-            <a:r>
-              <a:rPr b="0" lang="en-US" sz="1500" spc="-1" strike="noStrike">
-                <a:solidFill>
-                  <a:srgbClr val="000000"/>
-                </a:solidFill>
-                <a:latin typeface="Arial"/>
-                <a:ea typeface="DejaVu Sans"/>
-              </a:rPr>
-              <a:t>g</a:t>
-            </a:r>
-            <a:r>
-              <a:rPr b="0" lang="en-US" sz="1500" spc="-1" strike="noStrike">
-                <a:solidFill>
-                  <a:srgbClr val="000000"/>
-                </a:solidFill>
-                <a:latin typeface="Arial"/>
-                <a:ea typeface="DejaVu Sans"/>
-              </a:rPr>
-              <a:t>e</a:t>
-            </a:r>
-            <a:r>
-              <a:rPr b="0" lang="en-US" sz="1500" spc="-1" strike="noStrike">
-                <a:solidFill>
-                  <a:srgbClr val="000000"/>
-                </a:solidFill>
-                <a:latin typeface="Arial"/>
-                <a:ea typeface="DejaVu Sans"/>
-              </a:rPr>
-              <a:t> </a:t>
-            </a:r>
-            <a:r>
-              <a:rPr b="0" lang="en-US" sz="1500" spc="-1" strike="noStrike">
-                <a:solidFill>
-                  <a:srgbClr val="000000"/>
-                </a:solidFill>
-                <a:latin typeface="Arial"/>
-                <a:ea typeface="DejaVu Sans"/>
-              </a:rPr>
-              <a:t>‘</a:t>
-            </a:r>
-            <a:r>
-              <a:rPr b="0" lang="en-US" sz="1500" spc="-1" strike="noStrike">
-                <a:solidFill>
-                  <a:srgbClr val="000000"/>
-                </a:solidFill>
-                <a:latin typeface="Arial"/>
-                <a:ea typeface="DejaVu Sans"/>
-              </a:rPr>
-              <a:t>r</a:t>
-            </a:r>
-            <a:r>
-              <a:rPr b="0" lang="en-US" sz="1500" spc="-1" strike="noStrike">
-                <a:solidFill>
-                  <a:srgbClr val="000000"/>
-                </a:solidFill>
-                <a:latin typeface="Arial"/>
-                <a:ea typeface="DejaVu Sans"/>
-              </a:rPr>
-              <a:t>e</a:t>
-            </a:r>
-            <a:r>
-              <a:rPr b="0" lang="en-US" sz="1500" spc="-1" strike="noStrike">
-                <a:solidFill>
-                  <a:srgbClr val="000000"/>
-                </a:solidFill>
-                <a:latin typeface="Arial"/>
-                <a:ea typeface="DejaVu Sans"/>
-              </a:rPr>
-              <a:t>a</a:t>
-            </a:r>
-            <a:r>
-              <a:rPr b="0" lang="en-US" sz="1500" spc="-1" strike="noStrike">
-                <a:solidFill>
-                  <a:srgbClr val="000000"/>
-                </a:solidFill>
-                <a:latin typeface="Arial"/>
-                <a:ea typeface="DejaVu Sans"/>
-              </a:rPr>
-              <a:t>c</a:t>
-            </a:r>
-            <a:r>
-              <a:rPr b="0" lang="en-US" sz="1500" spc="-1" strike="noStrike">
-                <a:solidFill>
-                  <a:srgbClr val="000000"/>
-                </a:solidFill>
-                <a:latin typeface="Arial"/>
-                <a:ea typeface="DejaVu Sans"/>
-              </a:rPr>
-              <a:t>t</a:t>
-            </a:r>
-            <a:r>
-              <a:rPr b="0" lang="en-US" sz="1500" spc="-1" strike="noStrike">
-                <a:solidFill>
-                  <a:srgbClr val="000000"/>
-                </a:solidFill>
-                <a:latin typeface="Arial"/>
-                <a:ea typeface="DejaVu Sans"/>
-              </a:rPr>
-              <a:t>-</a:t>
-            </a:r>
-            <a:r>
-              <a:rPr b="0" lang="en-US" sz="1500" spc="-1" strike="noStrike">
-                <a:solidFill>
-                  <a:srgbClr val="000000"/>
-                </a:solidFill>
-                <a:latin typeface="Arial"/>
-                <a:ea typeface="DejaVu Sans"/>
-              </a:rPr>
-              <a:t>r</a:t>
-            </a:r>
-            <a:r>
-              <a:rPr b="0" lang="en-US" sz="1500" spc="-1" strike="noStrike">
-                <a:solidFill>
-                  <a:srgbClr val="000000"/>
-                </a:solidFill>
-                <a:latin typeface="Arial"/>
-                <a:ea typeface="DejaVu Sans"/>
-              </a:rPr>
-              <a:t>o</a:t>
-            </a:r>
-            <a:r>
-              <a:rPr b="0" lang="en-US" sz="1500" spc="-1" strike="noStrike">
-                <a:solidFill>
-                  <a:srgbClr val="000000"/>
-                </a:solidFill>
-                <a:latin typeface="Arial"/>
-                <a:ea typeface="DejaVu Sans"/>
-              </a:rPr>
-              <a:t>u</a:t>
-            </a:r>
-            <a:r>
-              <a:rPr b="0" lang="en-US" sz="1500" spc="-1" strike="noStrike">
-                <a:solidFill>
-                  <a:srgbClr val="000000"/>
-                </a:solidFill>
-                <a:latin typeface="Arial"/>
-                <a:ea typeface="DejaVu Sans"/>
-              </a:rPr>
-              <a:t>t</a:t>
-            </a:r>
-            <a:r>
-              <a:rPr b="0" lang="en-US" sz="1500" spc="-1" strike="noStrike">
-                <a:solidFill>
-                  <a:srgbClr val="000000"/>
-                </a:solidFill>
-                <a:latin typeface="Arial"/>
-                <a:ea typeface="DejaVu Sans"/>
-              </a:rPr>
-              <a:t>e</a:t>
-            </a:r>
-            <a:r>
-              <a:rPr b="0" lang="en-US" sz="1500" spc="-1" strike="noStrike">
-                <a:solidFill>
-                  <a:srgbClr val="000000"/>
-                </a:solidFill>
-                <a:latin typeface="Arial"/>
-                <a:ea typeface="DejaVu Sans"/>
-              </a:rPr>
-              <a:t>r</a:t>
-            </a:r>
-            <a:r>
-              <a:rPr b="0" lang="en-US" sz="1500" spc="-1" strike="noStrike">
-                <a:solidFill>
-                  <a:srgbClr val="000000"/>
-                </a:solidFill>
-                <a:latin typeface="Arial"/>
-                <a:ea typeface="DejaVu Sans"/>
-              </a:rPr>
-              <a:t>-</a:t>
-            </a:r>
-            <a:r>
-              <a:rPr b="0" lang="en-US" sz="1500" spc="-1" strike="noStrike">
-                <a:solidFill>
-                  <a:srgbClr val="000000"/>
-                </a:solidFill>
-                <a:latin typeface="Arial"/>
-                <a:ea typeface="DejaVu Sans"/>
-              </a:rPr>
-              <a:t>d</a:t>
-            </a:r>
-            <a:r>
-              <a:rPr b="0" lang="en-US" sz="1500" spc="-1" strike="noStrike">
-                <a:solidFill>
-                  <a:srgbClr val="000000"/>
-                </a:solidFill>
-                <a:latin typeface="Arial"/>
-                <a:ea typeface="DejaVu Sans"/>
-              </a:rPr>
-              <a:t>o</a:t>
-            </a:r>
-            <a:r>
-              <a:rPr b="0" lang="en-US" sz="1500" spc="-1" strike="noStrike">
-                <a:solidFill>
-                  <a:srgbClr val="000000"/>
-                </a:solidFill>
-                <a:latin typeface="Arial"/>
-                <a:ea typeface="DejaVu Sans"/>
-              </a:rPr>
-              <a:t>m</a:t>
-            </a:r>
-            <a:r>
-              <a:rPr b="0" lang="en-US" sz="1500" spc="-1" strike="noStrike">
-                <a:solidFill>
-                  <a:srgbClr val="000000"/>
-                </a:solidFill>
-                <a:latin typeface="Arial"/>
-                <a:ea typeface="DejaVu Sans"/>
-              </a:rPr>
-              <a:t>’</a:t>
+              <a:t>Package ‘react-router-dom’</a:t>
             </a:r>
             <a:endParaRPr b="0" lang="en-US" sz="1500" spc="-1" strike="noStrike">
               <a:latin typeface="Arial"/>
             </a:endParaRPr>
           </a:p>
           <a:p>
-            <a:pPr marL="285840" indent="-282960">
+            <a:pPr>
+              <a:lnSpc>
+                <a:spcPct val="120000"/>
+              </a:lnSpc>
+            </a:pPr>
+            <a:endParaRPr b="0" lang="en-US" sz="1500" spc="-1" strike="noStrike">
+              <a:latin typeface="Arial"/>
+            </a:endParaRPr>
+          </a:p>
+          <a:p>
+            <a:pPr marL="285840" indent="-282600">
               <a:lnSpc>
                 <a:spcPct val="120000"/>
               </a:lnSpc>
@@ -8618,12 +8433,32 @@
               <a:buFont typeface="Arial"/>
               <a:buChar char="•"/>
             </a:pPr>
+            <a:r>
+              <a:rPr b="0" lang="en-US" sz="1500" spc="-1" strike="noStrike">
+                <a:solidFill>
+                  <a:srgbClr val="000000"/>
+                </a:solidFill>
+                <a:latin typeface="Arial"/>
+                <a:ea typeface="DejaVu Sans"/>
+              </a:rPr>
+              <a:t>&lt;Router&gt; … &lt;/Router&gt; sets up the router</a:t>
+            </a:r>
             <a:endParaRPr b="0" lang="en-US" sz="1500" spc="-1" strike="noStrike">
               <a:latin typeface="Arial"/>
             </a:endParaRPr>
           </a:p>
           <a:p>
-            <a:pPr marL="285840" indent="-282960">
+            <a:pPr>
+              <a:lnSpc>
+                <a:spcPct val="120000"/>
+              </a:lnSpc>
+            </a:pPr>
+            <a:endParaRPr b="0" lang="en-US" sz="1500" spc="-1" strike="noStrike">
+              <a:latin typeface="Arial"/>
+            </a:endParaRPr>
+          </a:p>
+          <a:p>
+            <a:pPr marL="285840" indent="-282600">
               <a:lnSpc>
                 <a:spcPct val="120000"/>
               </a:lnSpc>
@@ -8641,394 +8476,24 @@
                 <a:latin typeface="Arial"/>
                 <a:ea typeface="DejaVu Sans"/>
               </a:rPr>
-              <a:t>&lt;</a:t>
-            </a:r>
-            <a:r>
-              <a:rPr b="0" lang="en-US" sz="1500" spc="-1" strike="noStrike">
-                <a:solidFill>
-                  <a:srgbClr val="000000"/>
-                </a:solidFill>
-                <a:latin typeface="Arial"/>
-                <a:ea typeface="DejaVu Sans"/>
-              </a:rPr>
-              <a:t>R</a:t>
-            </a:r>
-            <a:r>
-              <a:rPr b="0" lang="en-US" sz="1500" spc="-1" strike="noStrike">
-                <a:solidFill>
-                  <a:srgbClr val="000000"/>
-                </a:solidFill>
-                <a:latin typeface="Arial"/>
-                <a:ea typeface="DejaVu Sans"/>
-              </a:rPr>
-              <a:t>o</a:t>
-            </a:r>
-            <a:r>
-              <a:rPr b="0" lang="en-US" sz="1500" spc="-1" strike="noStrike">
-                <a:solidFill>
-                  <a:srgbClr val="000000"/>
-                </a:solidFill>
-                <a:latin typeface="Arial"/>
-                <a:ea typeface="DejaVu Sans"/>
-              </a:rPr>
-              <a:t>u</a:t>
-            </a:r>
-            <a:r>
-              <a:rPr b="0" lang="en-US" sz="1500" spc="-1" strike="noStrike">
-                <a:solidFill>
-                  <a:srgbClr val="000000"/>
-                </a:solidFill>
-                <a:latin typeface="Arial"/>
-                <a:ea typeface="DejaVu Sans"/>
-              </a:rPr>
-              <a:t>t</a:t>
-            </a:r>
-            <a:r>
-              <a:rPr b="0" lang="en-US" sz="1500" spc="-1" strike="noStrike">
-                <a:solidFill>
-                  <a:srgbClr val="000000"/>
-                </a:solidFill>
-                <a:latin typeface="Arial"/>
-                <a:ea typeface="DejaVu Sans"/>
-              </a:rPr>
-              <a:t>e</a:t>
-            </a:r>
-            <a:r>
-              <a:rPr b="0" lang="en-US" sz="1500" spc="-1" strike="noStrike">
-                <a:solidFill>
-                  <a:srgbClr val="000000"/>
-                </a:solidFill>
-                <a:latin typeface="Arial"/>
-                <a:ea typeface="DejaVu Sans"/>
-              </a:rPr>
-              <a:t>r</a:t>
-            </a:r>
-            <a:r>
-              <a:rPr b="0" lang="en-US" sz="1500" spc="-1" strike="noStrike">
-                <a:solidFill>
-                  <a:srgbClr val="000000"/>
-                </a:solidFill>
-                <a:latin typeface="Arial"/>
-                <a:ea typeface="DejaVu Sans"/>
-              </a:rPr>
-              <a:t>&gt;</a:t>
-            </a:r>
-            <a:r>
-              <a:rPr b="0" lang="en-US" sz="1500" spc="-1" strike="noStrike">
-                <a:solidFill>
-                  <a:srgbClr val="000000"/>
-                </a:solidFill>
-                <a:latin typeface="Arial"/>
-                <a:ea typeface="DejaVu Sans"/>
-              </a:rPr>
-              <a:t> </a:t>
-            </a:r>
-            <a:r>
-              <a:rPr b="0" lang="en-US" sz="1500" spc="-1" strike="noStrike">
-                <a:solidFill>
-                  <a:srgbClr val="000000"/>
-                </a:solidFill>
-                <a:latin typeface="Arial"/>
-                <a:ea typeface="DejaVu Sans"/>
-              </a:rPr>
-              <a:t>…</a:t>
-            </a:r>
-            <a:r>
-              <a:rPr b="0" lang="en-US" sz="1500" spc="-1" strike="noStrike">
-                <a:solidFill>
-                  <a:srgbClr val="000000"/>
-                </a:solidFill>
-                <a:latin typeface="Arial"/>
-                <a:ea typeface="DejaVu Sans"/>
-              </a:rPr>
-              <a:t> </a:t>
-            </a:r>
-            <a:r>
-              <a:rPr b="0" lang="en-US" sz="1500" spc="-1" strike="noStrike">
-                <a:solidFill>
-                  <a:srgbClr val="000000"/>
-                </a:solidFill>
-                <a:latin typeface="Arial"/>
-                <a:ea typeface="DejaVu Sans"/>
-              </a:rPr>
-              <a:t>&lt;</a:t>
-            </a:r>
-            <a:r>
-              <a:rPr b="0" lang="en-US" sz="1500" spc="-1" strike="noStrike">
-                <a:solidFill>
-                  <a:srgbClr val="000000"/>
-                </a:solidFill>
-                <a:latin typeface="Arial"/>
-                <a:ea typeface="DejaVu Sans"/>
-              </a:rPr>
-              <a:t>/</a:t>
-            </a:r>
-            <a:r>
-              <a:rPr b="0" lang="en-US" sz="1500" spc="-1" strike="noStrike">
-                <a:solidFill>
-                  <a:srgbClr val="000000"/>
-                </a:solidFill>
-                <a:latin typeface="Arial"/>
-                <a:ea typeface="DejaVu Sans"/>
-              </a:rPr>
-              <a:t>R</a:t>
-            </a:r>
-            <a:r>
-              <a:rPr b="0" lang="en-US" sz="1500" spc="-1" strike="noStrike">
-                <a:solidFill>
-                  <a:srgbClr val="000000"/>
-                </a:solidFill>
-                <a:latin typeface="Arial"/>
-                <a:ea typeface="DejaVu Sans"/>
-              </a:rPr>
-              <a:t>o</a:t>
-            </a:r>
-            <a:r>
-              <a:rPr b="0" lang="en-US" sz="1500" spc="-1" strike="noStrike">
-                <a:solidFill>
-                  <a:srgbClr val="000000"/>
-                </a:solidFill>
-                <a:latin typeface="Arial"/>
-                <a:ea typeface="DejaVu Sans"/>
-              </a:rPr>
-              <a:t>u</a:t>
-            </a:r>
-            <a:r>
-              <a:rPr b="0" lang="en-US" sz="1500" spc="-1" strike="noStrike">
-                <a:solidFill>
-                  <a:srgbClr val="000000"/>
-                </a:solidFill>
-                <a:latin typeface="Arial"/>
-                <a:ea typeface="DejaVu Sans"/>
-              </a:rPr>
-              <a:t>t</a:t>
-            </a:r>
-            <a:r>
-              <a:rPr b="0" lang="en-US" sz="1500" spc="-1" strike="noStrike">
-                <a:solidFill>
-                  <a:srgbClr val="000000"/>
-                </a:solidFill>
-                <a:latin typeface="Arial"/>
-                <a:ea typeface="DejaVu Sans"/>
-              </a:rPr>
-              <a:t>e</a:t>
-            </a:r>
-            <a:r>
-              <a:rPr b="0" lang="en-US" sz="1500" spc="-1" strike="noStrike">
-                <a:solidFill>
-                  <a:srgbClr val="000000"/>
-                </a:solidFill>
-                <a:latin typeface="Arial"/>
-                <a:ea typeface="DejaVu Sans"/>
-              </a:rPr>
-              <a:t>r</a:t>
-            </a:r>
-            <a:r>
-              <a:rPr b="0" lang="en-US" sz="1500" spc="-1" strike="noStrike">
-                <a:solidFill>
-                  <a:srgbClr val="000000"/>
-                </a:solidFill>
-                <a:latin typeface="Arial"/>
-                <a:ea typeface="DejaVu Sans"/>
-              </a:rPr>
-              <a:t>&gt;</a:t>
-            </a:r>
-            <a:r>
-              <a:rPr b="0" lang="en-US" sz="1500" spc="-1" strike="noStrike">
-                <a:solidFill>
-                  <a:srgbClr val="000000"/>
-                </a:solidFill>
-                <a:latin typeface="Arial"/>
-                <a:ea typeface="DejaVu Sans"/>
-              </a:rPr>
-              <a:t> </a:t>
-            </a:r>
-            <a:r>
-              <a:rPr b="0" lang="en-US" sz="1500" spc="-1" strike="noStrike">
-                <a:solidFill>
-                  <a:srgbClr val="000000"/>
-                </a:solidFill>
-                <a:latin typeface="Arial"/>
-                <a:ea typeface="DejaVu Sans"/>
-              </a:rPr>
-              <a:t>s</a:t>
-            </a:r>
-            <a:r>
-              <a:rPr b="0" lang="en-US" sz="1500" spc="-1" strike="noStrike">
-                <a:solidFill>
-                  <a:srgbClr val="000000"/>
-                </a:solidFill>
-                <a:latin typeface="Arial"/>
-                <a:ea typeface="DejaVu Sans"/>
-              </a:rPr>
-              <a:t>e</a:t>
-            </a:r>
-            <a:r>
-              <a:rPr b="0" lang="en-US" sz="1500" spc="-1" strike="noStrike">
-                <a:solidFill>
-                  <a:srgbClr val="000000"/>
-                </a:solidFill>
-                <a:latin typeface="Arial"/>
-                <a:ea typeface="DejaVu Sans"/>
-              </a:rPr>
-              <a:t>t</a:t>
-            </a:r>
-            <a:r>
-              <a:rPr b="0" lang="en-US" sz="1500" spc="-1" strike="noStrike">
-                <a:solidFill>
-                  <a:srgbClr val="000000"/>
-                </a:solidFill>
-                <a:latin typeface="Arial"/>
-                <a:ea typeface="DejaVu Sans"/>
-              </a:rPr>
-              <a:t>s</a:t>
-            </a:r>
-            <a:r>
-              <a:rPr b="0" lang="en-US" sz="1500" spc="-1" strike="noStrike">
-                <a:solidFill>
-                  <a:srgbClr val="000000"/>
-                </a:solidFill>
-                <a:latin typeface="Arial"/>
-                <a:ea typeface="DejaVu Sans"/>
-              </a:rPr>
-              <a:t> </a:t>
-            </a:r>
-            <a:r>
-              <a:rPr b="0" lang="en-US" sz="1500" spc="-1" strike="noStrike">
-                <a:solidFill>
-                  <a:srgbClr val="000000"/>
-                </a:solidFill>
-                <a:latin typeface="Arial"/>
-                <a:ea typeface="DejaVu Sans"/>
-              </a:rPr>
-              <a:t>u</a:t>
-            </a:r>
-            <a:r>
-              <a:rPr b="0" lang="en-US" sz="1500" spc="-1" strike="noStrike">
-                <a:solidFill>
-                  <a:srgbClr val="000000"/>
-                </a:solidFill>
-                <a:latin typeface="Arial"/>
-                <a:ea typeface="DejaVu Sans"/>
-              </a:rPr>
-              <a:t>p</a:t>
-            </a:r>
-            <a:r>
-              <a:rPr b="0" lang="en-US" sz="1500" spc="-1" strike="noStrike">
-                <a:solidFill>
-                  <a:srgbClr val="000000"/>
-                </a:solidFill>
-                <a:latin typeface="Arial"/>
-                <a:ea typeface="DejaVu Sans"/>
-              </a:rPr>
-              <a:t> </a:t>
-            </a:r>
-            <a:r>
-              <a:rPr b="0" lang="en-US" sz="1500" spc="-1" strike="noStrike">
-                <a:solidFill>
-                  <a:srgbClr val="000000"/>
-                </a:solidFill>
-                <a:latin typeface="Arial"/>
-                <a:ea typeface="DejaVu Sans"/>
-              </a:rPr>
-              <a:t>t</a:t>
-            </a:r>
-            <a:r>
-              <a:rPr b="0" lang="en-US" sz="1500" spc="-1" strike="noStrike">
-                <a:solidFill>
-                  <a:srgbClr val="000000"/>
-                </a:solidFill>
-                <a:latin typeface="Arial"/>
-                <a:ea typeface="DejaVu Sans"/>
-              </a:rPr>
-              <a:t>h</a:t>
-            </a:r>
-            <a:r>
-              <a:rPr b="0" lang="en-US" sz="1500" spc="-1" strike="noStrike">
-                <a:solidFill>
-                  <a:srgbClr val="000000"/>
-                </a:solidFill>
-                <a:latin typeface="Arial"/>
-                <a:ea typeface="DejaVu Sans"/>
-              </a:rPr>
-              <a:t>e</a:t>
-            </a:r>
-            <a:r>
-              <a:rPr b="0" lang="en-US" sz="1500" spc="-1" strike="noStrike">
-                <a:solidFill>
-                  <a:srgbClr val="000000"/>
-                </a:solidFill>
-                <a:latin typeface="Arial"/>
-                <a:ea typeface="DejaVu Sans"/>
-              </a:rPr>
-              <a:t> </a:t>
-            </a:r>
-            <a:r>
-              <a:rPr b="0" lang="en-US" sz="1500" spc="-1" strike="noStrike">
-                <a:solidFill>
-                  <a:srgbClr val="000000"/>
-                </a:solidFill>
-                <a:latin typeface="Arial"/>
-                <a:ea typeface="DejaVu Sans"/>
-              </a:rPr>
-              <a:t>r</a:t>
-            </a:r>
-            <a:r>
-              <a:rPr b="0" lang="en-US" sz="1500" spc="-1" strike="noStrike">
-                <a:solidFill>
-                  <a:srgbClr val="000000"/>
-                </a:solidFill>
-                <a:latin typeface="Arial"/>
-                <a:ea typeface="DejaVu Sans"/>
-              </a:rPr>
-              <a:t>o</a:t>
-            </a:r>
-            <a:r>
-              <a:rPr b="0" lang="en-US" sz="1500" spc="-1" strike="noStrike">
-                <a:solidFill>
-                  <a:srgbClr val="000000"/>
-                </a:solidFill>
-                <a:latin typeface="Arial"/>
-                <a:ea typeface="DejaVu Sans"/>
-              </a:rPr>
-              <a:t>u</a:t>
-            </a:r>
-            <a:r>
-              <a:rPr b="0" lang="en-US" sz="1500" spc="-1" strike="noStrike">
-                <a:solidFill>
-                  <a:srgbClr val="000000"/>
-                </a:solidFill>
-                <a:latin typeface="Arial"/>
-                <a:ea typeface="DejaVu Sans"/>
-              </a:rPr>
-              <a:t>t</a:t>
-            </a:r>
-            <a:r>
-              <a:rPr b="0" lang="en-US" sz="1500" spc="-1" strike="noStrike">
-                <a:solidFill>
-                  <a:srgbClr val="000000"/>
-                </a:solidFill>
-                <a:latin typeface="Arial"/>
-                <a:ea typeface="DejaVu Sans"/>
-              </a:rPr>
-              <a:t>e</a:t>
-            </a:r>
-            <a:r>
-              <a:rPr b="0" lang="en-US" sz="1500" spc="-1" strike="noStrike">
-                <a:solidFill>
-                  <a:srgbClr val="000000"/>
-                </a:solidFill>
-                <a:latin typeface="Arial"/>
-                <a:ea typeface="DejaVu Sans"/>
-              </a:rPr>
-              <a:t>r</a:t>
+              <a:t>&lt;Switch&gt; ... &lt;/Switch&gt; takes care of exclusivity</a:t>
             </a:r>
             <a:endParaRPr b="0" lang="en-US" sz="1500" spc="-1" strike="noStrike">
               <a:latin typeface="Arial"/>
             </a:endParaRPr>
           </a:p>
           <a:p>
-            <a:pPr marL="285840" indent="-282960">
+            <a:pPr>
+              <a:lnSpc>
+                <a:spcPct val="120000"/>
+              </a:lnSpc>
+            </a:pPr>
+            <a:endParaRPr b="0" lang="en-US" sz="1500" spc="-1" strike="noStrike">
+              <a:latin typeface="Arial"/>
+            </a:endParaRPr>
+          </a:p>
+          <a:p>
+            <a:pPr marL="285840" indent="-282600">
               <a:lnSpc>
                 <a:spcPct val="120000"/>
               </a:lnSpc>
@@ -9038,12 +8503,42 @@
               <a:buFont typeface="Arial"/>
               <a:buChar char="•"/>
             </a:pPr>
+            <a:r>
+              <a:rPr b="0" lang="en-US" sz="1500" spc="-1" strike="noStrike">
+                <a:solidFill>
+                  <a:srgbClr val="000000"/>
+                </a:solidFill>
+                <a:latin typeface="Arial"/>
+                <a:ea typeface="DejaVu Sans"/>
+              </a:rPr>
+              <a:t>&lt;Route /&gt; binds a path to a component</a:t>
+            </a:r>
             <a:endParaRPr b="0" lang="en-US" sz="1500" spc="-1" strike="noStrike">
               <a:latin typeface="Arial"/>
             </a:endParaRPr>
           </a:p>
           <a:p>
-            <a:pPr marL="285840" indent="-282960">
+            <a:pPr>
+              <a:lnSpc>
+                <a:spcPct val="120000"/>
+              </a:lnSpc>
+            </a:pPr>
+            <a:endParaRPr b="0" lang="en-US" sz="1500" spc="-1" strike="noStrike">
+              <a:latin typeface="Arial"/>
+            </a:endParaRPr>
+          </a:p>
+          <a:p>
+            <a:pPr>
+              <a:lnSpc>
+                <a:spcPct val="120000"/>
+              </a:lnSpc>
+            </a:pPr>
+            <a:endParaRPr b="0" lang="en-US" sz="1500" spc="-1" strike="noStrike">
+              <a:latin typeface="Arial"/>
+            </a:endParaRPr>
+          </a:p>
+          <a:p>
+            <a:pPr marL="285840" indent="-282600">
               <a:lnSpc>
                 <a:spcPct val="120000"/>
               </a:lnSpc>
@@ -9061,500 +8556,14 @@
                 <a:latin typeface="Arial"/>
                 <a:ea typeface="DejaVu Sans"/>
               </a:rPr>
-              <a:t>&lt;</a:t>
-            </a:r>
-            <a:r>
-              <a:rPr b="0" lang="en-US" sz="1500" spc="-1" strike="noStrike">
-                <a:solidFill>
-                  <a:srgbClr val="000000"/>
-                </a:solidFill>
-                <a:latin typeface="Arial"/>
-                <a:ea typeface="DejaVu Sans"/>
-              </a:rPr>
-              <a:t>S</a:t>
-            </a:r>
-            <a:r>
-              <a:rPr b="0" lang="en-US" sz="1500" spc="-1" strike="noStrike">
-                <a:solidFill>
-                  <a:srgbClr val="000000"/>
-                </a:solidFill>
-                <a:latin typeface="Arial"/>
-                <a:ea typeface="DejaVu Sans"/>
-              </a:rPr>
-              <a:t>w</a:t>
-            </a:r>
-            <a:r>
-              <a:rPr b="0" lang="en-US" sz="1500" spc="-1" strike="noStrike">
-                <a:solidFill>
-                  <a:srgbClr val="000000"/>
-                </a:solidFill>
-                <a:latin typeface="Arial"/>
-                <a:ea typeface="DejaVu Sans"/>
-              </a:rPr>
-              <a:t>i</a:t>
-            </a:r>
-            <a:r>
-              <a:rPr b="0" lang="en-US" sz="1500" spc="-1" strike="noStrike">
-                <a:solidFill>
-                  <a:srgbClr val="000000"/>
-                </a:solidFill>
-                <a:latin typeface="Arial"/>
-                <a:ea typeface="DejaVu Sans"/>
-              </a:rPr>
-              <a:t>t</a:t>
-            </a:r>
-            <a:r>
-              <a:rPr b="0" lang="en-US" sz="1500" spc="-1" strike="noStrike">
-                <a:solidFill>
-                  <a:srgbClr val="000000"/>
-                </a:solidFill>
-                <a:latin typeface="Arial"/>
-                <a:ea typeface="DejaVu Sans"/>
-              </a:rPr>
-              <a:t>c</a:t>
-            </a:r>
-            <a:r>
-              <a:rPr b="0" lang="en-US" sz="1500" spc="-1" strike="noStrike">
-                <a:solidFill>
-                  <a:srgbClr val="000000"/>
-                </a:solidFill>
-                <a:latin typeface="Arial"/>
-                <a:ea typeface="DejaVu Sans"/>
-              </a:rPr>
-              <a:t>h</a:t>
-            </a:r>
-            <a:r>
-              <a:rPr b="0" lang="en-US" sz="1500" spc="-1" strike="noStrike">
-                <a:solidFill>
-                  <a:srgbClr val="000000"/>
-                </a:solidFill>
-                <a:latin typeface="Arial"/>
-                <a:ea typeface="DejaVu Sans"/>
-              </a:rPr>
-              <a:t>&gt;</a:t>
-            </a:r>
-            <a:r>
-              <a:rPr b="0" lang="en-US" sz="1500" spc="-1" strike="noStrike">
-                <a:solidFill>
-                  <a:srgbClr val="000000"/>
-                </a:solidFill>
-                <a:latin typeface="Arial"/>
-                <a:ea typeface="DejaVu Sans"/>
-              </a:rPr>
-              <a:t> </a:t>
-            </a:r>
-            <a:r>
-              <a:rPr b="0" lang="en-US" sz="1500" spc="-1" strike="noStrike">
-                <a:solidFill>
-                  <a:srgbClr val="000000"/>
-                </a:solidFill>
-                <a:latin typeface="Arial"/>
-                <a:ea typeface="DejaVu Sans"/>
-              </a:rPr>
-              <a:t>.</a:t>
-            </a:r>
-            <a:r>
-              <a:rPr b="0" lang="en-US" sz="1500" spc="-1" strike="noStrike">
-                <a:solidFill>
-                  <a:srgbClr val="000000"/>
-                </a:solidFill>
-                <a:latin typeface="Arial"/>
-                <a:ea typeface="DejaVu Sans"/>
-              </a:rPr>
-              <a:t>.</a:t>
-            </a:r>
-            <a:r>
-              <a:rPr b="0" lang="en-US" sz="1500" spc="-1" strike="noStrike">
-                <a:solidFill>
-                  <a:srgbClr val="000000"/>
-                </a:solidFill>
-                <a:latin typeface="Arial"/>
-                <a:ea typeface="DejaVu Sans"/>
-              </a:rPr>
-              <a:t>.</a:t>
-            </a:r>
-            <a:r>
-              <a:rPr b="0" lang="en-US" sz="1500" spc="-1" strike="noStrike">
-                <a:solidFill>
-                  <a:srgbClr val="000000"/>
-                </a:solidFill>
-                <a:latin typeface="Arial"/>
-                <a:ea typeface="DejaVu Sans"/>
-              </a:rPr>
-              <a:t> </a:t>
-            </a:r>
-            <a:r>
-              <a:rPr b="0" lang="en-US" sz="1500" spc="-1" strike="noStrike">
-                <a:solidFill>
-                  <a:srgbClr val="000000"/>
-                </a:solidFill>
-                <a:latin typeface="Arial"/>
-                <a:ea typeface="DejaVu Sans"/>
-              </a:rPr>
-              <a:t>&lt;</a:t>
-            </a:r>
-            <a:r>
-              <a:rPr b="0" lang="en-US" sz="1500" spc="-1" strike="noStrike">
-                <a:solidFill>
-                  <a:srgbClr val="000000"/>
-                </a:solidFill>
-                <a:latin typeface="Arial"/>
-                <a:ea typeface="DejaVu Sans"/>
-              </a:rPr>
-              <a:t>/</a:t>
-            </a:r>
-            <a:r>
-              <a:rPr b="0" lang="en-US" sz="1500" spc="-1" strike="noStrike">
-                <a:solidFill>
-                  <a:srgbClr val="000000"/>
-                </a:solidFill>
-                <a:latin typeface="Arial"/>
-                <a:ea typeface="DejaVu Sans"/>
-              </a:rPr>
-              <a:t>S</a:t>
-            </a:r>
-            <a:r>
-              <a:rPr b="0" lang="en-US" sz="1500" spc="-1" strike="noStrike">
-                <a:solidFill>
-                  <a:srgbClr val="000000"/>
-                </a:solidFill>
-                <a:latin typeface="Arial"/>
-                <a:ea typeface="DejaVu Sans"/>
-              </a:rPr>
-              <a:t>w</a:t>
-            </a:r>
-            <a:r>
-              <a:rPr b="0" lang="en-US" sz="1500" spc="-1" strike="noStrike">
-                <a:solidFill>
-                  <a:srgbClr val="000000"/>
-                </a:solidFill>
-                <a:latin typeface="Arial"/>
-                <a:ea typeface="DejaVu Sans"/>
-              </a:rPr>
-              <a:t>i</a:t>
-            </a:r>
-            <a:r>
-              <a:rPr b="0" lang="en-US" sz="1500" spc="-1" strike="noStrike">
-                <a:solidFill>
-                  <a:srgbClr val="000000"/>
-                </a:solidFill>
-                <a:latin typeface="Arial"/>
-                <a:ea typeface="DejaVu Sans"/>
-              </a:rPr>
-              <a:t>t</a:t>
-            </a:r>
-            <a:r>
-              <a:rPr b="0" lang="en-US" sz="1500" spc="-1" strike="noStrike">
-                <a:solidFill>
-                  <a:srgbClr val="000000"/>
-                </a:solidFill>
-                <a:latin typeface="Arial"/>
-                <a:ea typeface="DejaVu Sans"/>
-              </a:rPr>
-              <a:t>c</a:t>
-            </a:r>
-            <a:r>
-              <a:rPr b="0" lang="en-US" sz="1500" spc="-1" strike="noStrike">
-                <a:solidFill>
-                  <a:srgbClr val="000000"/>
-                </a:solidFill>
-                <a:latin typeface="Arial"/>
-                <a:ea typeface="DejaVu Sans"/>
-              </a:rPr>
-              <a:t>h</a:t>
-            </a:r>
-            <a:r>
-              <a:rPr b="0" lang="en-US" sz="1500" spc="-1" strike="noStrike">
-                <a:solidFill>
-                  <a:srgbClr val="000000"/>
-                </a:solidFill>
-                <a:latin typeface="Arial"/>
-                <a:ea typeface="DejaVu Sans"/>
-              </a:rPr>
-              <a:t>&gt;</a:t>
-            </a:r>
-            <a:r>
-              <a:rPr b="0" lang="en-US" sz="1500" spc="-1" strike="noStrike">
-                <a:solidFill>
-                  <a:srgbClr val="000000"/>
-                </a:solidFill>
-                <a:latin typeface="Arial"/>
-                <a:ea typeface="DejaVu Sans"/>
-              </a:rPr>
-              <a:t> </a:t>
-            </a:r>
-            <a:r>
-              <a:rPr b="0" lang="en-US" sz="1500" spc="-1" strike="noStrike">
-                <a:solidFill>
-                  <a:srgbClr val="000000"/>
-                </a:solidFill>
-                <a:latin typeface="Arial"/>
-                <a:ea typeface="DejaVu Sans"/>
-              </a:rPr>
-              <a:t>t</a:t>
-            </a:r>
-            <a:r>
-              <a:rPr b="0" lang="en-US" sz="1500" spc="-1" strike="noStrike">
-                <a:solidFill>
-                  <a:srgbClr val="000000"/>
-                </a:solidFill>
-                <a:latin typeface="Arial"/>
-                <a:ea typeface="DejaVu Sans"/>
-              </a:rPr>
-              <a:t>a</a:t>
-            </a:r>
-            <a:r>
-              <a:rPr b="0" lang="en-US" sz="1500" spc="-1" strike="noStrike">
-                <a:solidFill>
-                  <a:srgbClr val="000000"/>
-                </a:solidFill>
-                <a:latin typeface="Arial"/>
-                <a:ea typeface="DejaVu Sans"/>
-              </a:rPr>
-              <a:t>k</a:t>
-            </a:r>
-            <a:r>
-              <a:rPr b="0" lang="en-US" sz="1500" spc="-1" strike="noStrike">
-                <a:solidFill>
-                  <a:srgbClr val="000000"/>
-                </a:solidFill>
-                <a:latin typeface="Arial"/>
-                <a:ea typeface="DejaVu Sans"/>
-              </a:rPr>
-              <a:t>e</a:t>
-            </a:r>
-            <a:r>
-              <a:rPr b="0" lang="en-US" sz="1500" spc="-1" strike="noStrike">
-                <a:solidFill>
-                  <a:srgbClr val="000000"/>
-                </a:solidFill>
-                <a:latin typeface="Arial"/>
-                <a:ea typeface="DejaVu Sans"/>
-              </a:rPr>
-              <a:t>s</a:t>
-            </a:r>
-            <a:r>
-              <a:rPr b="0" lang="en-US" sz="1500" spc="-1" strike="noStrike">
-                <a:solidFill>
-                  <a:srgbClr val="000000"/>
-                </a:solidFill>
-                <a:latin typeface="Arial"/>
-                <a:ea typeface="DejaVu Sans"/>
-              </a:rPr>
-              <a:t> </a:t>
-            </a:r>
-            <a:r>
-              <a:rPr b="0" lang="en-US" sz="1500" spc="-1" strike="noStrike">
-                <a:solidFill>
-                  <a:srgbClr val="000000"/>
-                </a:solidFill>
-                <a:latin typeface="Arial"/>
-                <a:ea typeface="DejaVu Sans"/>
-              </a:rPr>
-              <a:t>c</a:t>
-            </a:r>
-            <a:r>
-              <a:rPr b="0" lang="en-US" sz="1500" spc="-1" strike="noStrike">
-                <a:solidFill>
-                  <a:srgbClr val="000000"/>
-                </a:solidFill>
-                <a:latin typeface="Arial"/>
-                <a:ea typeface="DejaVu Sans"/>
-              </a:rPr>
-              <a:t>a</a:t>
-            </a:r>
-            <a:r>
-              <a:rPr b="0" lang="en-US" sz="1500" spc="-1" strike="noStrike">
-                <a:solidFill>
-                  <a:srgbClr val="000000"/>
-                </a:solidFill>
-                <a:latin typeface="Arial"/>
-                <a:ea typeface="DejaVu Sans"/>
-              </a:rPr>
-              <a:t>r</a:t>
-            </a:r>
-            <a:r>
-              <a:rPr b="0" lang="en-US" sz="1500" spc="-1" strike="noStrike">
-                <a:solidFill>
-                  <a:srgbClr val="000000"/>
-                </a:solidFill>
-                <a:latin typeface="Arial"/>
-                <a:ea typeface="DejaVu Sans"/>
-              </a:rPr>
-              <a:t>e</a:t>
-            </a:r>
-            <a:r>
-              <a:rPr b="0" lang="en-US" sz="1500" spc="-1" strike="noStrike">
-                <a:solidFill>
-                  <a:srgbClr val="000000"/>
-                </a:solidFill>
-                <a:latin typeface="Arial"/>
-                <a:ea typeface="DejaVu Sans"/>
-              </a:rPr>
-              <a:t> </a:t>
-            </a:r>
-            <a:r>
-              <a:rPr b="0" lang="en-US" sz="1500" spc="-1" strike="noStrike">
-                <a:solidFill>
-                  <a:srgbClr val="000000"/>
-                </a:solidFill>
-                <a:latin typeface="Arial"/>
-                <a:ea typeface="DejaVu Sans"/>
-              </a:rPr>
-              <a:t>o</a:t>
-            </a:r>
-            <a:r>
-              <a:rPr b="0" lang="en-US" sz="1500" spc="-1" strike="noStrike">
-                <a:solidFill>
-                  <a:srgbClr val="000000"/>
-                </a:solidFill>
-                <a:latin typeface="Arial"/>
-                <a:ea typeface="DejaVu Sans"/>
-              </a:rPr>
-              <a:t>f</a:t>
-            </a:r>
-            <a:r>
-              <a:rPr b="0" lang="en-US" sz="1500" spc="-1" strike="noStrike">
-                <a:solidFill>
-                  <a:srgbClr val="000000"/>
-                </a:solidFill>
-                <a:latin typeface="Arial"/>
-                <a:ea typeface="DejaVu Sans"/>
-              </a:rPr>
-              <a:t> </a:t>
-            </a:r>
-            <a:r>
-              <a:rPr b="0" lang="en-US" sz="1500" spc="-1" strike="noStrike">
-                <a:solidFill>
-                  <a:srgbClr val="000000"/>
-                </a:solidFill>
-                <a:latin typeface="Arial"/>
-                <a:ea typeface="DejaVu Sans"/>
-              </a:rPr>
-              <a:t>e</a:t>
-            </a:r>
-            <a:r>
-              <a:rPr b="0" lang="en-US" sz="1500" spc="-1" strike="noStrike">
-                <a:solidFill>
-                  <a:srgbClr val="000000"/>
-                </a:solidFill>
-                <a:latin typeface="Arial"/>
-                <a:ea typeface="DejaVu Sans"/>
-              </a:rPr>
-              <a:t>x</a:t>
-            </a:r>
-            <a:r>
-              <a:rPr b="0" lang="en-US" sz="1500" spc="-1" strike="noStrike">
-                <a:solidFill>
-                  <a:srgbClr val="000000"/>
-                </a:solidFill>
-                <a:latin typeface="Arial"/>
-                <a:ea typeface="DejaVu Sans"/>
-              </a:rPr>
-              <a:t>c</a:t>
-            </a:r>
-            <a:r>
-              <a:rPr b="0" lang="en-US" sz="1500" spc="-1" strike="noStrike">
-                <a:solidFill>
-                  <a:srgbClr val="000000"/>
-                </a:solidFill>
-                <a:latin typeface="Arial"/>
-                <a:ea typeface="DejaVu Sans"/>
-              </a:rPr>
-              <a:t>l</a:t>
-            </a:r>
-            <a:r>
-              <a:rPr b="0" lang="en-US" sz="1500" spc="-1" strike="noStrike">
-                <a:solidFill>
-                  <a:srgbClr val="000000"/>
-                </a:solidFill>
-                <a:latin typeface="Arial"/>
-                <a:ea typeface="DejaVu Sans"/>
-              </a:rPr>
-              <a:t>u</a:t>
-            </a:r>
-            <a:r>
-              <a:rPr b="0" lang="en-US" sz="1500" spc="-1" strike="noStrike">
-                <a:solidFill>
-                  <a:srgbClr val="000000"/>
-                </a:solidFill>
-                <a:latin typeface="Arial"/>
-                <a:ea typeface="DejaVu Sans"/>
-              </a:rPr>
-              <a:t>s</a:t>
-            </a:r>
-            <a:r>
-              <a:rPr b="0" lang="en-US" sz="1500" spc="-1" strike="noStrike">
-                <a:solidFill>
-                  <a:srgbClr val="000000"/>
-                </a:solidFill>
-                <a:latin typeface="Arial"/>
-                <a:ea typeface="DejaVu Sans"/>
-              </a:rPr>
-              <a:t>i</a:t>
-            </a:r>
-            <a:r>
-              <a:rPr b="0" lang="en-US" sz="1500" spc="-1" strike="noStrike">
-                <a:solidFill>
-                  <a:srgbClr val="000000"/>
-                </a:solidFill>
-                <a:latin typeface="Arial"/>
-                <a:ea typeface="DejaVu Sans"/>
-              </a:rPr>
-              <a:t>v</a:t>
-            </a:r>
-            <a:r>
-              <a:rPr b="0" lang="en-US" sz="1500" spc="-1" strike="noStrike">
-                <a:solidFill>
-                  <a:srgbClr val="000000"/>
-                </a:solidFill>
-                <a:latin typeface="Arial"/>
-                <a:ea typeface="DejaVu Sans"/>
-              </a:rPr>
-              <a:t>i</a:t>
-            </a:r>
-            <a:r>
-              <a:rPr b="0" lang="en-US" sz="1500" spc="-1" strike="noStrike">
-                <a:solidFill>
-                  <a:srgbClr val="000000"/>
-                </a:solidFill>
-                <a:latin typeface="Arial"/>
-                <a:ea typeface="DejaVu Sans"/>
-              </a:rPr>
-              <a:t>t</a:t>
-            </a:r>
-            <a:r>
-              <a:rPr b="0" lang="en-US" sz="1500" spc="-1" strike="noStrike">
-                <a:solidFill>
-                  <a:srgbClr val="000000"/>
-                </a:solidFill>
-                <a:latin typeface="Arial"/>
-                <a:ea typeface="DejaVu Sans"/>
-              </a:rPr>
-              <a:t>y</a:t>
+              <a:t>Declarative routing! </a:t>
             </a:r>
             <a:endParaRPr b="0" lang="en-US" sz="1500" spc="-1" strike="noStrike">
               <a:latin typeface="Arial"/>
             </a:endParaRPr>
           </a:p>
           <a:p>
-            <a:pPr lvl="1" marL="432000" indent="-216000">
-              <a:lnSpc>
-                <a:spcPct val="120000"/>
-              </a:lnSpc>
-              <a:buClr>
-                <a:srgbClr val="000000"/>
-              </a:buClr>
-              <a:buSzPct val="45000"/>
-              <a:buFont typeface="Wingdings" charset="2"/>
-              <a:buChar char=""/>
-            </a:pPr>
-            <a:endParaRPr b="0" lang="en-US" sz="1500" spc="-1" strike="noStrike">
-              <a:latin typeface="Arial"/>
-            </a:endParaRPr>
-          </a:p>
-          <a:p>
-            <a:pPr marL="285840" indent="-282960">
+            <a:pPr marL="285840" indent="-282600">
               <a:lnSpc>
                 <a:spcPct val="120000"/>
               </a:lnSpc>
@@ -9572,1002 +8581,17 @@
                 <a:latin typeface="Arial"/>
                 <a:ea typeface="DejaVu Sans"/>
               </a:rPr>
-              <a:t>&lt;</a:t>
-            </a:r>
-            <a:r>
-              <a:rPr b="0" lang="en-US" sz="1500" spc="-1" strike="noStrike">
-                <a:solidFill>
-                  <a:srgbClr val="000000"/>
-                </a:solidFill>
-                <a:latin typeface="Arial"/>
-                <a:ea typeface="DejaVu Sans"/>
-              </a:rPr>
-              <a:t>R</a:t>
-            </a:r>
-            <a:r>
-              <a:rPr b="0" lang="en-US" sz="1500" spc="-1" strike="noStrike">
-                <a:solidFill>
-                  <a:srgbClr val="000000"/>
-                </a:solidFill>
-                <a:latin typeface="Arial"/>
-                <a:ea typeface="DejaVu Sans"/>
-              </a:rPr>
-              <a:t>o</a:t>
-            </a:r>
-            <a:r>
-              <a:rPr b="0" lang="en-US" sz="1500" spc="-1" strike="noStrike">
-                <a:solidFill>
-                  <a:srgbClr val="000000"/>
-                </a:solidFill>
-                <a:latin typeface="Arial"/>
-                <a:ea typeface="DejaVu Sans"/>
-              </a:rPr>
-              <a:t>u</a:t>
-            </a:r>
-            <a:r>
-              <a:rPr b="0" lang="en-US" sz="1500" spc="-1" strike="noStrike">
-                <a:solidFill>
-                  <a:srgbClr val="000000"/>
-                </a:solidFill>
-                <a:latin typeface="Arial"/>
-                <a:ea typeface="DejaVu Sans"/>
-              </a:rPr>
-              <a:t>t</a:t>
-            </a:r>
-            <a:r>
-              <a:rPr b="0" lang="en-US" sz="1500" spc="-1" strike="noStrike">
-                <a:solidFill>
-                  <a:srgbClr val="000000"/>
-                </a:solidFill>
-                <a:latin typeface="Arial"/>
-                <a:ea typeface="DejaVu Sans"/>
-              </a:rPr>
-              <a:t>e</a:t>
-            </a:r>
-            <a:r>
-              <a:rPr b="0" lang="en-US" sz="1500" spc="-1" strike="noStrike">
-                <a:solidFill>
-                  <a:srgbClr val="000000"/>
-                </a:solidFill>
-                <a:latin typeface="Arial"/>
-                <a:ea typeface="DejaVu Sans"/>
-              </a:rPr>
-              <a:t> </a:t>
-            </a:r>
-            <a:r>
-              <a:rPr b="0" lang="en-US" sz="1500" spc="-1" strike="noStrike">
-                <a:solidFill>
-                  <a:srgbClr val="000000"/>
-                </a:solidFill>
-                <a:latin typeface="Arial"/>
-                <a:ea typeface="DejaVu Sans"/>
-              </a:rPr>
-              <a:t>/</a:t>
-            </a:r>
-            <a:r>
-              <a:rPr b="0" lang="en-US" sz="1500" spc="-1" strike="noStrike">
-                <a:solidFill>
-                  <a:srgbClr val="000000"/>
-                </a:solidFill>
-                <a:latin typeface="Arial"/>
-                <a:ea typeface="DejaVu Sans"/>
-              </a:rPr>
-              <a:t>&gt;</a:t>
-            </a:r>
-            <a:r>
-              <a:rPr b="0" lang="en-US" sz="1500" spc="-1" strike="noStrike">
-                <a:solidFill>
-                  <a:srgbClr val="000000"/>
-                </a:solidFill>
-                <a:latin typeface="Arial"/>
-                <a:ea typeface="DejaVu Sans"/>
-              </a:rPr>
-              <a:t> </a:t>
-            </a:r>
-            <a:r>
-              <a:rPr b="0" lang="en-US" sz="1500" spc="-1" strike="noStrike">
-                <a:solidFill>
-                  <a:srgbClr val="000000"/>
-                </a:solidFill>
-                <a:latin typeface="Arial"/>
-                <a:ea typeface="DejaVu Sans"/>
-              </a:rPr>
-              <a:t>b</a:t>
-            </a:r>
-            <a:r>
-              <a:rPr b="0" lang="en-US" sz="1500" spc="-1" strike="noStrike">
-                <a:solidFill>
-                  <a:srgbClr val="000000"/>
-                </a:solidFill>
-                <a:latin typeface="Arial"/>
-                <a:ea typeface="DejaVu Sans"/>
-              </a:rPr>
-              <a:t>i</a:t>
-            </a:r>
-            <a:r>
-              <a:rPr b="0" lang="en-US" sz="1500" spc="-1" strike="noStrike">
-                <a:solidFill>
-                  <a:srgbClr val="000000"/>
-                </a:solidFill>
-                <a:latin typeface="Arial"/>
-                <a:ea typeface="DejaVu Sans"/>
-              </a:rPr>
-              <a:t>n</a:t>
-            </a:r>
-            <a:r>
-              <a:rPr b="0" lang="en-US" sz="1500" spc="-1" strike="noStrike">
-                <a:solidFill>
-                  <a:srgbClr val="000000"/>
-                </a:solidFill>
-                <a:latin typeface="Arial"/>
-                <a:ea typeface="DejaVu Sans"/>
-              </a:rPr>
-              <a:t>d</a:t>
-            </a:r>
-            <a:r>
-              <a:rPr b="0" lang="en-US" sz="1500" spc="-1" strike="noStrike">
-                <a:solidFill>
-                  <a:srgbClr val="000000"/>
-                </a:solidFill>
-                <a:latin typeface="Arial"/>
-                <a:ea typeface="DejaVu Sans"/>
-              </a:rPr>
-              <a:t>s</a:t>
-            </a:r>
-            <a:r>
-              <a:rPr b="0" lang="en-US" sz="1500" spc="-1" strike="noStrike">
-                <a:solidFill>
-                  <a:srgbClr val="000000"/>
-                </a:solidFill>
-                <a:latin typeface="Arial"/>
-                <a:ea typeface="DejaVu Sans"/>
-              </a:rPr>
-              <a:t> </a:t>
-            </a:r>
-            <a:r>
-              <a:rPr b="0" lang="en-US" sz="1500" spc="-1" strike="noStrike">
-                <a:solidFill>
-                  <a:srgbClr val="000000"/>
-                </a:solidFill>
-                <a:latin typeface="Arial"/>
-                <a:ea typeface="DejaVu Sans"/>
-              </a:rPr>
-              <a:t>a</a:t>
-            </a:r>
-            <a:r>
-              <a:rPr b="0" lang="en-US" sz="1500" spc="-1" strike="noStrike">
-                <a:solidFill>
-                  <a:srgbClr val="000000"/>
-                </a:solidFill>
-                <a:latin typeface="Arial"/>
-                <a:ea typeface="DejaVu Sans"/>
-              </a:rPr>
-              <a:t> </a:t>
-            </a:r>
-            <a:r>
-              <a:rPr b="0" lang="en-US" sz="1500" spc="-1" strike="noStrike">
-                <a:solidFill>
-                  <a:srgbClr val="000000"/>
-                </a:solidFill>
-                <a:latin typeface="Arial"/>
-                <a:ea typeface="DejaVu Sans"/>
-              </a:rPr>
-              <a:t>p</a:t>
-            </a:r>
-            <a:r>
-              <a:rPr b="0" lang="en-US" sz="1500" spc="-1" strike="noStrike">
-                <a:solidFill>
-                  <a:srgbClr val="000000"/>
-                </a:solidFill>
-                <a:latin typeface="Arial"/>
-                <a:ea typeface="DejaVu Sans"/>
-              </a:rPr>
-              <a:t>a</a:t>
-            </a:r>
-            <a:r>
-              <a:rPr b="0" lang="en-US" sz="1500" spc="-1" strike="noStrike">
-                <a:solidFill>
-                  <a:srgbClr val="000000"/>
-                </a:solidFill>
-                <a:latin typeface="Arial"/>
-                <a:ea typeface="DejaVu Sans"/>
-              </a:rPr>
-              <a:t>t</a:t>
-            </a:r>
-            <a:r>
-              <a:rPr b="0" lang="en-US" sz="1500" spc="-1" strike="noStrike">
-                <a:solidFill>
-                  <a:srgbClr val="000000"/>
-                </a:solidFill>
-                <a:latin typeface="Arial"/>
-                <a:ea typeface="DejaVu Sans"/>
-              </a:rPr>
-              <a:t>h</a:t>
-            </a:r>
-            <a:r>
-              <a:rPr b="0" lang="en-US" sz="1500" spc="-1" strike="noStrike">
-                <a:solidFill>
-                  <a:srgbClr val="000000"/>
-                </a:solidFill>
-                <a:latin typeface="Arial"/>
-                <a:ea typeface="DejaVu Sans"/>
-              </a:rPr>
-              <a:t> </a:t>
-            </a:r>
-            <a:r>
-              <a:rPr b="0" lang="en-US" sz="1500" spc="-1" strike="noStrike">
-                <a:solidFill>
-                  <a:srgbClr val="000000"/>
-                </a:solidFill>
-                <a:latin typeface="Arial"/>
-                <a:ea typeface="DejaVu Sans"/>
-              </a:rPr>
-              <a:t>t</a:t>
-            </a:r>
-            <a:r>
-              <a:rPr b="0" lang="en-US" sz="1500" spc="-1" strike="noStrike">
-                <a:solidFill>
-                  <a:srgbClr val="000000"/>
-                </a:solidFill>
-                <a:latin typeface="Arial"/>
-                <a:ea typeface="DejaVu Sans"/>
-              </a:rPr>
-              <a:t>o</a:t>
-            </a:r>
-            <a:r>
-              <a:rPr b="0" lang="en-US" sz="1500" spc="-1" strike="noStrike">
-                <a:solidFill>
-                  <a:srgbClr val="000000"/>
-                </a:solidFill>
-                <a:latin typeface="Arial"/>
-                <a:ea typeface="DejaVu Sans"/>
-              </a:rPr>
-              <a:t> </a:t>
-            </a:r>
-            <a:r>
-              <a:rPr b="0" lang="en-US" sz="1500" spc="-1" strike="noStrike">
-                <a:solidFill>
-                  <a:srgbClr val="000000"/>
-                </a:solidFill>
-                <a:latin typeface="Arial"/>
-                <a:ea typeface="DejaVu Sans"/>
-              </a:rPr>
-              <a:t>a</a:t>
-            </a:r>
-            <a:r>
-              <a:rPr b="0" lang="en-US" sz="1500" spc="-1" strike="noStrike">
-                <a:solidFill>
-                  <a:srgbClr val="000000"/>
-                </a:solidFill>
-                <a:latin typeface="Arial"/>
-                <a:ea typeface="DejaVu Sans"/>
-              </a:rPr>
-              <a:t> </a:t>
-            </a:r>
-            <a:r>
-              <a:rPr b="0" lang="en-US" sz="1500" spc="-1" strike="noStrike">
-                <a:solidFill>
-                  <a:srgbClr val="000000"/>
-                </a:solidFill>
-                <a:latin typeface="Arial"/>
-                <a:ea typeface="DejaVu Sans"/>
-              </a:rPr>
-              <a:t>c</a:t>
-            </a:r>
-            <a:r>
-              <a:rPr b="0" lang="en-US" sz="1500" spc="-1" strike="noStrike">
-                <a:solidFill>
-                  <a:srgbClr val="000000"/>
-                </a:solidFill>
-                <a:latin typeface="Arial"/>
-                <a:ea typeface="DejaVu Sans"/>
-              </a:rPr>
-              <a:t>o</a:t>
-            </a:r>
-            <a:r>
-              <a:rPr b="0" lang="en-US" sz="1500" spc="-1" strike="noStrike">
-                <a:solidFill>
-                  <a:srgbClr val="000000"/>
-                </a:solidFill>
-                <a:latin typeface="Arial"/>
-                <a:ea typeface="DejaVu Sans"/>
-              </a:rPr>
-              <a:t>m</a:t>
-            </a:r>
-            <a:r>
-              <a:rPr b="0" lang="en-US" sz="1500" spc="-1" strike="noStrike">
-                <a:solidFill>
-                  <a:srgbClr val="000000"/>
-                </a:solidFill>
-                <a:latin typeface="Arial"/>
-                <a:ea typeface="DejaVu Sans"/>
-              </a:rPr>
-              <a:t>p</a:t>
-            </a:r>
-            <a:r>
-              <a:rPr b="0" lang="en-US" sz="1500" spc="-1" strike="noStrike">
-                <a:solidFill>
-                  <a:srgbClr val="000000"/>
-                </a:solidFill>
-                <a:latin typeface="Arial"/>
-                <a:ea typeface="DejaVu Sans"/>
-              </a:rPr>
-              <a:t>o</a:t>
-            </a:r>
-            <a:r>
-              <a:rPr b="0" lang="en-US" sz="1500" spc="-1" strike="noStrike">
-                <a:solidFill>
-                  <a:srgbClr val="000000"/>
-                </a:solidFill>
-                <a:latin typeface="Arial"/>
-                <a:ea typeface="DejaVu Sans"/>
-              </a:rPr>
-              <a:t>n</a:t>
-            </a:r>
-            <a:r>
-              <a:rPr b="0" lang="en-US" sz="1500" spc="-1" strike="noStrike">
-                <a:solidFill>
-                  <a:srgbClr val="000000"/>
-                </a:solidFill>
-                <a:latin typeface="Arial"/>
-                <a:ea typeface="DejaVu Sans"/>
-              </a:rPr>
-              <a:t>e</a:t>
-            </a:r>
-            <a:r>
-              <a:rPr b="0" lang="en-US" sz="1500" spc="-1" strike="noStrike">
-                <a:solidFill>
-                  <a:srgbClr val="000000"/>
-                </a:solidFill>
-                <a:latin typeface="Arial"/>
-                <a:ea typeface="DejaVu Sans"/>
-              </a:rPr>
-              <a:t>n</a:t>
-            </a:r>
-            <a:r>
-              <a:rPr b="0" lang="en-US" sz="1500" spc="-1" strike="noStrike">
-                <a:solidFill>
-                  <a:srgbClr val="000000"/>
-                </a:solidFill>
-                <a:latin typeface="Arial"/>
-                <a:ea typeface="DejaVu Sans"/>
-              </a:rPr>
-              <a:t>t</a:t>
+              <a:t>Add extra routes wherever you want!</a:t>
             </a:r>
             <a:endParaRPr b="0" lang="en-US" sz="1500" spc="-1" strike="noStrike">
               <a:latin typeface="Arial"/>
             </a:endParaRPr>
           </a:p>
           <a:p>
-            <a:pPr marL="285840" indent="-282960">
+            <a:pPr>
               <a:lnSpc>
                 <a:spcPct val="120000"/>
               </a:lnSpc>
-              <a:buClr>
-                <a:srgbClr val="000000"/>
-              </a:buClr>
-              <a:buFont typeface="Arial"/>
-              <a:buChar char="•"/>
-            </a:pPr>
-            <a:endParaRPr b="0" lang="en-US" sz="1500" spc="-1" strike="noStrike">
-              <a:latin typeface="Arial"/>
-            </a:endParaRPr>
-          </a:p>
-          <a:p>
-            <a:pPr marL="285840" indent="-282960">
-              <a:lnSpc>
-                <a:spcPct val="120000"/>
-              </a:lnSpc>
-              <a:buClr>
-                <a:srgbClr val="000000"/>
-              </a:buClr>
-              <a:buFont typeface="Arial"/>
-              <a:buChar char="•"/>
-            </a:pPr>
-            <a:endParaRPr b="0" lang="en-US" sz="1500" spc="-1" strike="noStrike">
-              <a:latin typeface="Arial"/>
-            </a:endParaRPr>
-          </a:p>
-          <a:p>
-            <a:pPr marL="285840" indent="-282960">
-              <a:lnSpc>
-                <a:spcPct val="120000"/>
-              </a:lnSpc>
-              <a:buClr>
-                <a:srgbClr val="000000"/>
-              </a:buClr>
-              <a:buFont typeface="Arial"/>
-              <a:buChar char="•"/>
-            </a:pPr>
-            <a:r>
-              <a:rPr b="0" lang="en-US" sz="1500" spc="-1" strike="noStrike">
-                <a:solidFill>
-                  <a:srgbClr val="000000"/>
-                </a:solidFill>
-                <a:latin typeface="Arial"/>
-                <a:ea typeface="DejaVu Sans"/>
-              </a:rPr>
-              <a:t>D</a:t>
-            </a:r>
-            <a:r>
-              <a:rPr b="0" lang="en-US" sz="1500" spc="-1" strike="noStrike">
-                <a:solidFill>
-                  <a:srgbClr val="000000"/>
-                </a:solidFill>
-                <a:latin typeface="Arial"/>
-                <a:ea typeface="DejaVu Sans"/>
-              </a:rPr>
-              <a:t>e</a:t>
-            </a:r>
-            <a:r>
-              <a:rPr b="0" lang="en-US" sz="1500" spc="-1" strike="noStrike">
-                <a:solidFill>
-                  <a:srgbClr val="000000"/>
-                </a:solidFill>
-                <a:latin typeface="Arial"/>
-                <a:ea typeface="DejaVu Sans"/>
-              </a:rPr>
-              <a:t>c</a:t>
-            </a:r>
-            <a:r>
-              <a:rPr b="0" lang="en-US" sz="1500" spc="-1" strike="noStrike">
-                <a:solidFill>
-                  <a:srgbClr val="000000"/>
-                </a:solidFill>
-                <a:latin typeface="Arial"/>
-                <a:ea typeface="DejaVu Sans"/>
-              </a:rPr>
-              <a:t>l</a:t>
-            </a:r>
-            <a:r>
-              <a:rPr b="0" lang="en-US" sz="1500" spc="-1" strike="noStrike">
-                <a:solidFill>
-                  <a:srgbClr val="000000"/>
-                </a:solidFill>
-                <a:latin typeface="Arial"/>
-                <a:ea typeface="DejaVu Sans"/>
-              </a:rPr>
-              <a:t>a</a:t>
-            </a:r>
-            <a:r>
-              <a:rPr b="0" lang="en-US" sz="1500" spc="-1" strike="noStrike">
-                <a:solidFill>
-                  <a:srgbClr val="000000"/>
-                </a:solidFill>
-                <a:latin typeface="Arial"/>
-                <a:ea typeface="DejaVu Sans"/>
-              </a:rPr>
-              <a:t>r</a:t>
-            </a:r>
-            <a:r>
-              <a:rPr b="0" lang="en-US" sz="1500" spc="-1" strike="noStrike">
-                <a:solidFill>
-                  <a:srgbClr val="000000"/>
-                </a:solidFill>
-                <a:latin typeface="Arial"/>
-                <a:ea typeface="DejaVu Sans"/>
-              </a:rPr>
-              <a:t>a</a:t>
-            </a:r>
-            <a:r>
-              <a:rPr b="0" lang="en-US" sz="1500" spc="-1" strike="noStrike">
-                <a:solidFill>
-                  <a:srgbClr val="000000"/>
-                </a:solidFill>
-                <a:latin typeface="Arial"/>
-                <a:ea typeface="DejaVu Sans"/>
-              </a:rPr>
-              <a:t>t</a:t>
-            </a:r>
-            <a:r>
-              <a:rPr b="0" lang="en-US" sz="1500" spc="-1" strike="noStrike">
-                <a:solidFill>
-                  <a:srgbClr val="000000"/>
-                </a:solidFill>
-                <a:latin typeface="Arial"/>
-                <a:ea typeface="DejaVu Sans"/>
-              </a:rPr>
-              <a:t>i</a:t>
-            </a:r>
-            <a:r>
-              <a:rPr b="0" lang="en-US" sz="1500" spc="-1" strike="noStrike">
-                <a:solidFill>
-                  <a:srgbClr val="000000"/>
-                </a:solidFill>
-                <a:latin typeface="Arial"/>
-                <a:ea typeface="DejaVu Sans"/>
-              </a:rPr>
-              <a:t>v</a:t>
-            </a:r>
-            <a:r>
-              <a:rPr b="0" lang="en-US" sz="1500" spc="-1" strike="noStrike">
-                <a:solidFill>
-                  <a:srgbClr val="000000"/>
-                </a:solidFill>
-                <a:latin typeface="Arial"/>
-                <a:ea typeface="DejaVu Sans"/>
-              </a:rPr>
-              <a:t>e</a:t>
-            </a:r>
-            <a:r>
-              <a:rPr b="0" lang="en-US" sz="1500" spc="-1" strike="noStrike">
-                <a:solidFill>
-                  <a:srgbClr val="000000"/>
-                </a:solidFill>
-                <a:latin typeface="Arial"/>
-                <a:ea typeface="DejaVu Sans"/>
-              </a:rPr>
-              <a:t> </a:t>
-            </a:r>
-            <a:r>
-              <a:rPr b="0" lang="en-US" sz="1500" spc="-1" strike="noStrike">
-                <a:solidFill>
-                  <a:srgbClr val="000000"/>
-                </a:solidFill>
-                <a:latin typeface="Arial"/>
-                <a:ea typeface="DejaVu Sans"/>
-              </a:rPr>
-              <a:t>r</a:t>
-            </a:r>
-            <a:r>
-              <a:rPr b="0" lang="en-US" sz="1500" spc="-1" strike="noStrike">
-                <a:solidFill>
-                  <a:srgbClr val="000000"/>
-                </a:solidFill>
-                <a:latin typeface="Arial"/>
-                <a:ea typeface="DejaVu Sans"/>
-              </a:rPr>
-              <a:t>o</a:t>
-            </a:r>
-            <a:r>
-              <a:rPr b="0" lang="en-US" sz="1500" spc="-1" strike="noStrike">
-                <a:solidFill>
-                  <a:srgbClr val="000000"/>
-                </a:solidFill>
-                <a:latin typeface="Arial"/>
-                <a:ea typeface="DejaVu Sans"/>
-              </a:rPr>
-              <a:t>u</a:t>
-            </a:r>
-            <a:r>
-              <a:rPr b="0" lang="en-US" sz="1500" spc="-1" strike="noStrike">
-                <a:solidFill>
-                  <a:srgbClr val="000000"/>
-                </a:solidFill>
-                <a:latin typeface="Arial"/>
-                <a:ea typeface="DejaVu Sans"/>
-              </a:rPr>
-              <a:t>t</a:t>
-            </a:r>
-            <a:r>
-              <a:rPr b="0" lang="en-US" sz="1500" spc="-1" strike="noStrike">
-                <a:solidFill>
-                  <a:srgbClr val="000000"/>
-                </a:solidFill>
-                <a:latin typeface="Arial"/>
-                <a:ea typeface="DejaVu Sans"/>
-              </a:rPr>
-              <a:t>i</a:t>
-            </a:r>
-            <a:r>
-              <a:rPr b="0" lang="en-US" sz="1500" spc="-1" strike="noStrike">
-                <a:solidFill>
-                  <a:srgbClr val="000000"/>
-                </a:solidFill>
-                <a:latin typeface="Arial"/>
-                <a:ea typeface="DejaVu Sans"/>
-              </a:rPr>
-              <a:t>n</a:t>
-            </a:r>
-            <a:r>
-              <a:rPr b="0" lang="en-US" sz="1500" spc="-1" strike="noStrike">
-                <a:solidFill>
-                  <a:srgbClr val="000000"/>
-                </a:solidFill>
-                <a:latin typeface="Arial"/>
-                <a:ea typeface="DejaVu Sans"/>
-              </a:rPr>
-              <a:t>g</a:t>
-            </a:r>
-            <a:r>
-              <a:rPr b="0" lang="en-US" sz="1500" spc="-1" strike="noStrike">
-                <a:solidFill>
-                  <a:srgbClr val="000000"/>
-                </a:solidFill>
-                <a:latin typeface="Arial"/>
-                <a:ea typeface="DejaVu Sans"/>
-              </a:rPr>
-              <a:t>!</a:t>
-            </a:r>
-            <a:r>
-              <a:rPr b="0" lang="en-US" sz="1500" spc="-1" strike="noStrike">
-                <a:solidFill>
-                  <a:srgbClr val="000000"/>
-                </a:solidFill>
-                <a:latin typeface="Arial"/>
-                <a:ea typeface="DejaVu Sans"/>
-              </a:rPr>
-              <a:t> </a:t>
-            </a:r>
-            <a:endParaRPr b="0" lang="en-US" sz="1500" spc="-1" strike="noStrike">
-              <a:latin typeface="Arial"/>
-            </a:endParaRPr>
-          </a:p>
-          <a:p>
-            <a:pPr marL="285840" indent="-282960">
-              <a:lnSpc>
-                <a:spcPct val="120000"/>
-              </a:lnSpc>
-              <a:buClr>
-                <a:srgbClr val="000000"/>
-              </a:buClr>
-              <a:buFont typeface="Arial"/>
-              <a:buChar char="•"/>
-            </a:pPr>
-            <a:r>
-              <a:rPr b="0" lang="en-US" sz="1500" spc="-1" strike="noStrike">
-                <a:solidFill>
-                  <a:srgbClr val="000000"/>
-                </a:solidFill>
-                <a:latin typeface="Arial"/>
-                <a:ea typeface="DejaVu Sans"/>
-              </a:rPr>
-              <a:t>A</a:t>
-            </a:r>
-            <a:r>
-              <a:rPr b="0" lang="en-US" sz="1500" spc="-1" strike="noStrike">
-                <a:solidFill>
-                  <a:srgbClr val="000000"/>
-                </a:solidFill>
-                <a:latin typeface="Arial"/>
-                <a:ea typeface="DejaVu Sans"/>
-              </a:rPr>
-              <a:t>d</a:t>
-            </a:r>
-            <a:r>
-              <a:rPr b="0" lang="en-US" sz="1500" spc="-1" strike="noStrike">
-                <a:solidFill>
-                  <a:srgbClr val="000000"/>
-                </a:solidFill>
-                <a:latin typeface="Arial"/>
-                <a:ea typeface="DejaVu Sans"/>
-              </a:rPr>
-              <a:t>d</a:t>
-            </a:r>
-            <a:r>
-              <a:rPr b="0" lang="en-US" sz="1500" spc="-1" strike="noStrike">
-                <a:solidFill>
-                  <a:srgbClr val="000000"/>
-                </a:solidFill>
-                <a:latin typeface="Arial"/>
-                <a:ea typeface="DejaVu Sans"/>
-              </a:rPr>
-              <a:t> </a:t>
-            </a:r>
-            <a:r>
-              <a:rPr b="0" lang="en-US" sz="1500" spc="-1" strike="noStrike">
-                <a:solidFill>
-                  <a:srgbClr val="000000"/>
-                </a:solidFill>
-                <a:latin typeface="Arial"/>
-                <a:ea typeface="DejaVu Sans"/>
-              </a:rPr>
-              <a:t>e</a:t>
-            </a:r>
-            <a:r>
-              <a:rPr b="0" lang="en-US" sz="1500" spc="-1" strike="noStrike">
-                <a:solidFill>
-                  <a:srgbClr val="000000"/>
-                </a:solidFill>
-                <a:latin typeface="Arial"/>
-                <a:ea typeface="DejaVu Sans"/>
-              </a:rPr>
-              <a:t>x</a:t>
-            </a:r>
-            <a:r>
-              <a:rPr b="0" lang="en-US" sz="1500" spc="-1" strike="noStrike">
-                <a:solidFill>
-                  <a:srgbClr val="000000"/>
-                </a:solidFill>
-                <a:latin typeface="Arial"/>
-                <a:ea typeface="DejaVu Sans"/>
-              </a:rPr>
-              <a:t>t</a:t>
-            </a:r>
-            <a:r>
-              <a:rPr b="0" lang="en-US" sz="1500" spc="-1" strike="noStrike">
-                <a:solidFill>
-                  <a:srgbClr val="000000"/>
-                </a:solidFill>
-                <a:latin typeface="Arial"/>
-                <a:ea typeface="DejaVu Sans"/>
-              </a:rPr>
-              <a:t>r</a:t>
-            </a:r>
-            <a:r>
-              <a:rPr b="0" lang="en-US" sz="1500" spc="-1" strike="noStrike">
-                <a:solidFill>
-                  <a:srgbClr val="000000"/>
-                </a:solidFill>
-                <a:latin typeface="Arial"/>
-                <a:ea typeface="DejaVu Sans"/>
-              </a:rPr>
-              <a:t>a</a:t>
-            </a:r>
-            <a:r>
-              <a:rPr b="0" lang="en-US" sz="1500" spc="-1" strike="noStrike">
-                <a:solidFill>
-                  <a:srgbClr val="000000"/>
-                </a:solidFill>
-                <a:latin typeface="Arial"/>
-                <a:ea typeface="DejaVu Sans"/>
-              </a:rPr>
-              <a:t> </a:t>
-            </a:r>
-            <a:r>
-              <a:rPr b="0" lang="en-US" sz="1500" spc="-1" strike="noStrike">
-                <a:solidFill>
-                  <a:srgbClr val="000000"/>
-                </a:solidFill>
-                <a:latin typeface="Arial"/>
-                <a:ea typeface="DejaVu Sans"/>
-              </a:rPr>
-              <a:t>r</a:t>
-            </a:r>
-            <a:r>
-              <a:rPr b="0" lang="en-US" sz="1500" spc="-1" strike="noStrike">
-                <a:solidFill>
-                  <a:srgbClr val="000000"/>
-                </a:solidFill>
-                <a:latin typeface="Arial"/>
-                <a:ea typeface="DejaVu Sans"/>
-              </a:rPr>
-              <a:t>o</a:t>
-            </a:r>
-            <a:r>
-              <a:rPr b="0" lang="en-US" sz="1500" spc="-1" strike="noStrike">
-                <a:solidFill>
-                  <a:srgbClr val="000000"/>
-                </a:solidFill>
-                <a:latin typeface="Arial"/>
-                <a:ea typeface="DejaVu Sans"/>
-              </a:rPr>
-              <a:t>u</a:t>
-            </a:r>
-            <a:r>
-              <a:rPr b="0" lang="en-US" sz="1500" spc="-1" strike="noStrike">
-                <a:solidFill>
-                  <a:srgbClr val="000000"/>
-                </a:solidFill>
-                <a:latin typeface="Arial"/>
-                <a:ea typeface="DejaVu Sans"/>
-              </a:rPr>
-              <a:t>t</a:t>
-            </a:r>
-            <a:r>
-              <a:rPr b="0" lang="en-US" sz="1500" spc="-1" strike="noStrike">
-                <a:solidFill>
-                  <a:srgbClr val="000000"/>
-                </a:solidFill>
-                <a:latin typeface="Arial"/>
-                <a:ea typeface="DejaVu Sans"/>
-              </a:rPr>
-              <a:t>e</a:t>
-            </a:r>
-            <a:r>
-              <a:rPr b="0" lang="en-US" sz="1500" spc="-1" strike="noStrike">
-                <a:solidFill>
-                  <a:srgbClr val="000000"/>
-                </a:solidFill>
-                <a:latin typeface="Arial"/>
-                <a:ea typeface="DejaVu Sans"/>
-              </a:rPr>
-              <a:t>s</a:t>
-            </a:r>
-            <a:r>
-              <a:rPr b="0" lang="en-US" sz="1500" spc="-1" strike="noStrike">
-                <a:solidFill>
-                  <a:srgbClr val="000000"/>
-                </a:solidFill>
-                <a:latin typeface="Arial"/>
-                <a:ea typeface="DejaVu Sans"/>
-              </a:rPr>
-              <a:t> </a:t>
-            </a:r>
-            <a:r>
-              <a:rPr b="0" lang="en-US" sz="1500" spc="-1" strike="noStrike">
-                <a:solidFill>
-                  <a:srgbClr val="000000"/>
-                </a:solidFill>
-                <a:latin typeface="Arial"/>
-                <a:ea typeface="DejaVu Sans"/>
-              </a:rPr>
-              <a:t>w</a:t>
-            </a:r>
-            <a:r>
-              <a:rPr b="0" lang="en-US" sz="1500" spc="-1" strike="noStrike">
-                <a:solidFill>
-                  <a:srgbClr val="000000"/>
-                </a:solidFill>
-                <a:latin typeface="Arial"/>
-                <a:ea typeface="DejaVu Sans"/>
-              </a:rPr>
-              <a:t>h</a:t>
-            </a:r>
-            <a:r>
-              <a:rPr b="0" lang="en-US" sz="1500" spc="-1" strike="noStrike">
-                <a:solidFill>
-                  <a:srgbClr val="000000"/>
-                </a:solidFill>
-                <a:latin typeface="Arial"/>
-                <a:ea typeface="DejaVu Sans"/>
-              </a:rPr>
-              <a:t>e</a:t>
-            </a:r>
-            <a:r>
-              <a:rPr b="0" lang="en-US" sz="1500" spc="-1" strike="noStrike">
-                <a:solidFill>
-                  <a:srgbClr val="000000"/>
-                </a:solidFill>
-                <a:latin typeface="Arial"/>
-                <a:ea typeface="DejaVu Sans"/>
-              </a:rPr>
-              <a:t>r</a:t>
-            </a:r>
-            <a:r>
-              <a:rPr b="0" lang="en-US" sz="1500" spc="-1" strike="noStrike">
-                <a:solidFill>
-                  <a:srgbClr val="000000"/>
-                </a:solidFill>
-                <a:latin typeface="Arial"/>
-                <a:ea typeface="DejaVu Sans"/>
-              </a:rPr>
-              <a:t>e</a:t>
-            </a:r>
-            <a:r>
-              <a:rPr b="0" lang="en-US" sz="1500" spc="-1" strike="noStrike">
-                <a:solidFill>
-                  <a:srgbClr val="000000"/>
-                </a:solidFill>
-                <a:latin typeface="Arial"/>
-                <a:ea typeface="DejaVu Sans"/>
-              </a:rPr>
-              <a:t>v</a:t>
-            </a:r>
-            <a:r>
-              <a:rPr b="0" lang="en-US" sz="1500" spc="-1" strike="noStrike">
-                <a:solidFill>
-                  <a:srgbClr val="000000"/>
-                </a:solidFill>
-                <a:latin typeface="Arial"/>
-                <a:ea typeface="DejaVu Sans"/>
-              </a:rPr>
-              <a:t>e</a:t>
-            </a:r>
-            <a:r>
-              <a:rPr b="0" lang="en-US" sz="1500" spc="-1" strike="noStrike">
-                <a:solidFill>
-                  <a:srgbClr val="000000"/>
-                </a:solidFill>
-                <a:latin typeface="Arial"/>
-                <a:ea typeface="DejaVu Sans"/>
-              </a:rPr>
-              <a:t>r</a:t>
-            </a:r>
-            <a:r>
-              <a:rPr b="0" lang="en-US" sz="1500" spc="-1" strike="noStrike">
-                <a:solidFill>
-                  <a:srgbClr val="000000"/>
-                </a:solidFill>
-                <a:latin typeface="Arial"/>
-                <a:ea typeface="DejaVu Sans"/>
-              </a:rPr>
-              <a:t> </a:t>
-            </a:r>
-            <a:r>
-              <a:rPr b="0" lang="en-US" sz="1500" spc="-1" strike="noStrike">
-                <a:solidFill>
-                  <a:srgbClr val="000000"/>
-                </a:solidFill>
-                <a:latin typeface="Arial"/>
-                <a:ea typeface="DejaVu Sans"/>
-              </a:rPr>
-              <a:t>y</a:t>
-            </a:r>
-            <a:r>
-              <a:rPr b="0" lang="en-US" sz="1500" spc="-1" strike="noStrike">
-                <a:solidFill>
-                  <a:srgbClr val="000000"/>
-                </a:solidFill>
-                <a:latin typeface="Arial"/>
-                <a:ea typeface="DejaVu Sans"/>
-              </a:rPr>
-              <a:t>o</a:t>
-            </a:r>
-            <a:r>
-              <a:rPr b="0" lang="en-US" sz="1500" spc="-1" strike="noStrike">
-                <a:solidFill>
-                  <a:srgbClr val="000000"/>
-                </a:solidFill>
-                <a:latin typeface="Arial"/>
-                <a:ea typeface="DejaVu Sans"/>
-              </a:rPr>
-              <a:t>u</a:t>
-            </a:r>
-            <a:r>
-              <a:rPr b="0" lang="en-US" sz="1500" spc="-1" strike="noStrike">
-                <a:solidFill>
-                  <a:srgbClr val="000000"/>
-                </a:solidFill>
-                <a:latin typeface="Arial"/>
-                <a:ea typeface="DejaVu Sans"/>
-              </a:rPr>
-              <a:t> </a:t>
-            </a:r>
-            <a:r>
-              <a:rPr b="0" lang="en-US" sz="1500" spc="-1" strike="noStrike">
-                <a:solidFill>
-                  <a:srgbClr val="000000"/>
-                </a:solidFill>
-                <a:latin typeface="Arial"/>
-                <a:ea typeface="DejaVu Sans"/>
-              </a:rPr>
-              <a:t>w</a:t>
-            </a:r>
-            <a:r>
-              <a:rPr b="0" lang="en-US" sz="1500" spc="-1" strike="noStrike">
-                <a:solidFill>
-                  <a:srgbClr val="000000"/>
-                </a:solidFill>
-                <a:latin typeface="Arial"/>
-                <a:ea typeface="DejaVu Sans"/>
-              </a:rPr>
-              <a:t>a</a:t>
-            </a:r>
-            <a:r>
-              <a:rPr b="0" lang="en-US" sz="1500" spc="-1" strike="noStrike">
-                <a:solidFill>
-                  <a:srgbClr val="000000"/>
-                </a:solidFill>
-                <a:latin typeface="Arial"/>
-                <a:ea typeface="DejaVu Sans"/>
-              </a:rPr>
-              <a:t>n</a:t>
-            </a:r>
-            <a:r>
-              <a:rPr b="0" lang="en-US" sz="1500" spc="-1" strike="noStrike">
-                <a:solidFill>
-                  <a:srgbClr val="000000"/>
-                </a:solidFill>
-                <a:latin typeface="Arial"/>
-                <a:ea typeface="DejaVu Sans"/>
-              </a:rPr>
-              <a:t>t</a:t>
-            </a:r>
-            <a:r>
-              <a:rPr b="0" lang="en-US" sz="1500" spc="-1" strike="noStrike">
-                <a:solidFill>
-                  <a:srgbClr val="000000"/>
-                </a:solidFill>
-                <a:latin typeface="Arial"/>
-                <a:ea typeface="DejaVu Sans"/>
-              </a:rPr>
-              <a:t>!</a:t>
-            </a:r>
-            <a:endParaRPr b="0" lang="en-US" sz="1500" spc="-1" strike="noStrike">
-              <a:latin typeface="Arial"/>
-            </a:endParaRPr>
-          </a:p>
-          <a:p>
-            <a:pPr marL="285840" indent="-282960">
-              <a:lnSpc>
-                <a:spcPct val="120000"/>
-              </a:lnSpc>
-              <a:buClr>
-                <a:srgbClr val="000000"/>
-              </a:buClr>
-              <a:buFont typeface="Arial"/>
-              <a:buChar char="•"/>
             </a:pPr>
             <a:endParaRPr b="0" lang="en-US" sz="1500" spc="-1" strike="noStrike">
               <a:latin typeface="Arial"/>
@@ -10588,7 +8612,7 @@
         <p:spPr>
           <a:xfrm>
             <a:off x="5265720" y="1019520"/>
-            <a:ext cx="3695400" cy="1266480"/>
+            <a:ext cx="3695040" cy="1266120"/>
           </a:xfrm>
           <a:prstGeom prst="rect">
             <a:avLst/>
@@ -10611,7 +8635,7 @@
         <p:spPr>
           <a:xfrm>
             <a:off x="4431240" y="2468880"/>
-            <a:ext cx="4438440" cy="2418840"/>
+            <a:ext cx="4438080" cy="2418480"/>
           </a:xfrm>
           <a:prstGeom prst="rect">
             <a:avLst/>
@@ -10679,7 +8703,7 @@
         <p:spPr>
           <a:xfrm>
             <a:off x="720000" y="288000"/>
-            <a:ext cx="6621120" cy="501120"/>
+            <a:ext cx="6620760" cy="500760"/>
           </a:xfrm>
           <a:prstGeom prst="rect">
             <a:avLst/>
@@ -10728,7 +8752,7 @@
         <p:spPr>
           <a:xfrm>
             <a:off x="4968000" y="5004000"/>
-            <a:ext cx="3237120" cy="105120"/>
+            <a:ext cx="3236760" cy="104760"/>
           </a:xfrm>
           <a:prstGeom prst="rect">
             <a:avLst/>
@@ -10777,7 +8801,7 @@
         <p:spPr>
           <a:xfrm>
             <a:off x="8280000" y="5004000"/>
-            <a:ext cx="141120" cy="105120"/>
+            <a:ext cx="140760" cy="104760"/>
           </a:xfrm>
           <a:prstGeom prst="rect">
             <a:avLst/>
@@ -10801,7 +8825,7 @@
                 <a:spcPct val="100000"/>
               </a:lnSpc>
             </a:pPr>
-            <a:fld id="{B9B533BD-1935-4691-AADE-278AE636D4C1}" type="slidenum">
+            <a:fld id="{3A08AC68-AA4A-4E69-B0BF-3E8F30CBEA2B}" type="slidenum">
               <a:rPr b="0" lang="en-US" sz="600" spc="-1" strike="noStrike">
                 <a:solidFill>
                   <a:srgbClr val="ffffff"/>
@@ -10809,7 +8833,7 @@
                 <a:latin typeface="Arial"/>
                 <a:ea typeface="DejaVu Sans"/>
               </a:rPr>
-              <a:t>&lt;number&gt;</a:t>
+              <a:t>1</a:t>
             </a:fld>
             <a:endParaRPr b="0" lang="en-US" sz="600" spc="-1" strike="noStrike">
               <a:latin typeface="Arial"/>
@@ -10826,7 +8850,7 @@
         <p:spPr>
           <a:xfrm>
             <a:off x="602640" y="504720"/>
-            <a:ext cx="6621120" cy="3884400"/>
+            <a:ext cx="6620760" cy="3884040"/>
           </a:xfrm>
           <a:prstGeom prst="rect">
             <a:avLst/>
@@ -10855,7 +8879,7 @@
             </a:endParaRPr>
           </a:p>
           <a:p>
-            <a:pPr marL="285840" indent="-282960">
+            <a:pPr marL="285840" indent="-282600">
               <a:lnSpc>
                 <a:spcPct val="120000"/>
               </a:lnSpc>
@@ -10880,7 +8904,17 @@
             </a:endParaRPr>
           </a:p>
           <a:p>
-            <a:pPr marL="285840" indent="-282960">
+            <a:pPr>
+              <a:lnSpc>
+                <a:spcPct val="120000"/>
+              </a:lnSpc>
+            </a:pPr>
+            <a:endParaRPr b="0" lang="en-US" sz="1500" spc="-1" strike="noStrike">
+              <a:latin typeface="Arial"/>
+            </a:endParaRPr>
+          </a:p>
+          <a:p>
+            <a:pPr marL="285840" indent="-282600">
               <a:lnSpc>
                 <a:spcPct val="120000"/>
               </a:lnSpc>
@@ -10890,12 +8924,32 @@
               <a:buFont typeface="Arial"/>
               <a:buChar char="•"/>
             </a:pPr>
+            <a:r>
+              <a:rPr b="0" lang="en-US" sz="1500" spc="-1" strike="noStrike">
+                <a:solidFill>
+                  <a:srgbClr val="000000"/>
+                </a:solidFill>
+                <a:latin typeface="Arial"/>
+                <a:ea typeface="DejaVu Sans"/>
+              </a:rPr>
+              <a:t>Easy use of variables</a:t>
+            </a:r>
             <a:endParaRPr b="0" lang="en-US" sz="1500" spc="-1" strike="noStrike">
               <a:latin typeface="Arial"/>
             </a:endParaRPr>
           </a:p>
           <a:p>
-            <a:pPr marL="285840" indent="-282960">
+            <a:pPr>
+              <a:lnSpc>
+                <a:spcPct val="120000"/>
+              </a:lnSpc>
+            </a:pPr>
+            <a:endParaRPr b="0" lang="en-US" sz="1500" spc="-1" strike="noStrike">
+              <a:latin typeface="Arial"/>
+            </a:endParaRPr>
+          </a:p>
+          <a:p>
+            <a:pPr marL="285840" indent="-282600">
               <a:lnSpc>
                 <a:spcPct val="120000"/>
               </a:lnSpc>
@@ -10913,14 +8967,24 @@
                 <a:latin typeface="Arial"/>
                 <a:ea typeface="DejaVu Sans"/>
               </a:rPr>
-              <a:t>Easy use of variables</a:t>
+              <a:t>No automatic inheritance</a:t>
             </a:r>
             <a:endParaRPr b="0" lang="en-US" sz="1500" spc="-1" strike="noStrike">
               <a:latin typeface="Arial"/>
             </a:endParaRPr>
           </a:p>
           <a:p>
-            <a:pPr marL="285840" indent="-282960">
+            <a:pPr>
+              <a:lnSpc>
+                <a:spcPct val="120000"/>
+              </a:lnSpc>
+            </a:pPr>
+            <a:endParaRPr b="0" lang="en-US" sz="1500" spc="-1" strike="noStrike">
+              <a:latin typeface="Arial"/>
+            </a:endParaRPr>
+          </a:p>
+          <a:p>
+            <a:pPr marL="285840" indent="-282600">
               <a:lnSpc>
                 <a:spcPct val="120000"/>
               </a:lnSpc>
@@ -10930,21 +8994,6 @@
               <a:buFont typeface="Arial"/>
               <a:buChar char="•"/>
             </a:pPr>
-            <a:endParaRPr b="0" lang="en-US" sz="1500" spc="-1" strike="noStrike">
-              <a:latin typeface="Arial"/>
-            </a:endParaRPr>
-          </a:p>
-          <a:p>
-            <a:pPr marL="285840" indent="-282960">
-              <a:lnSpc>
-                <a:spcPct val="120000"/>
-              </a:lnSpc>
-              <a:buClr>
-                <a:srgbClr val="000000"/>
-              </a:buClr>
-              <a:buFont typeface="Arial"/>
-              <a:buChar char="•"/>
-            </a:pPr>
             <a:r>
               <a:rPr b="0" lang="en-US" sz="1500" spc="-1" strike="noStrike">
                 <a:solidFill>
@@ -10953,62 +9002,17 @@
                 <a:latin typeface="Arial"/>
                 <a:ea typeface="DejaVu Sans"/>
               </a:rPr>
-              <a:t>No automatic inheritance</a:t>
+              <a:t>Scoped: no side effects!</a:t>
             </a:r>
             <a:endParaRPr b="0" lang="en-US" sz="1500" spc="-1" strike="noStrike">
               <a:latin typeface="Arial"/>
             </a:endParaRPr>
           </a:p>
           <a:p>
-            <a:pPr marL="285840" indent="-282960">
+            <a:pPr>
               <a:lnSpc>
                 <a:spcPct val="120000"/>
               </a:lnSpc>
-              <a:buClr>
-                <a:srgbClr val="000000"/>
-              </a:buClr>
-              <a:buFont typeface="Arial"/>
-              <a:buChar char="•"/>
-            </a:pPr>
-            <a:endParaRPr b="0" lang="en-US" sz="1500" spc="-1" strike="noStrike">
-              <a:latin typeface="Arial"/>
-            </a:endParaRPr>
-          </a:p>
-          <a:p>
-            <a:pPr marL="285840" indent="-282960">
-              <a:lnSpc>
-                <a:spcPct val="120000"/>
-              </a:lnSpc>
-              <a:buClr>
-                <a:srgbClr val="000000"/>
-              </a:buClr>
-              <a:buFont typeface="Arial"/>
-              <a:buChar char="•"/>
-            </a:pPr>
-            <a:r>
-              <a:rPr b="0" lang="en-US" sz="1500" spc="-1" strike="noStrike">
-                <a:solidFill>
-                  <a:srgbClr val="000000"/>
-                </a:solidFill>
-                <a:latin typeface="Arial"/>
-                <a:ea typeface="DejaVu Sans"/>
-              </a:rPr>
-              <a:t>Scoped: no side effects!</a:t>
-            </a:r>
-            <a:endParaRPr b="0" lang="en-US" sz="1500" spc="-1" strike="noStrike">
-              <a:latin typeface="Arial"/>
-            </a:endParaRPr>
-          </a:p>
-          <a:p>
-            <a:pPr marL="285840" indent="-282960">
-              <a:lnSpc>
-                <a:spcPct val="120000"/>
-              </a:lnSpc>
-              <a:buClr>
-                <a:srgbClr val="000000"/>
-              </a:buClr>
-              <a:buFont typeface="Arial"/>
-              <a:buChar char="•"/>
             </a:pPr>
             <a:endParaRPr b="0" lang="en-US" sz="1500" spc="-1" strike="noStrike">
               <a:latin typeface="Arial"/>
@@ -11029,7 +9033,7 @@
         <p:spPr>
           <a:xfrm>
             <a:off x="4663440" y="52920"/>
-            <a:ext cx="4466880" cy="5028840"/>
+            <a:ext cx="4466520" cy="5028480"/>
           </a:xfrm>
           <a:prstGeom prst="rect">
             <a:avLst/>
@@ -11097,7 +9101,7 @@
         <p:spPr>
           <a:xfrm>
             <a:off x="720000" y="288000"/>
-            <a:ext cx="6621120" cy="501120"/>
+            <a:ext cx="6620760" cy="500760"/>
           </a:xfrm>
           <a:prstGeom prst="rect">
             <a:avLst/>
@@ -11146,7 +9150,7 @@
         <p:spPr>
           <a:xfrm>
             <a:off x="2347200" y="2194560"/>
-            <a:ext cx="2405160" cy="776160"/>
+            <a:ext cx="2404800" cy="775800"/>
           </a:xfrm>
           <a:prstGeom prst="rect">
             <a:avLst/>
@@ -11195,7 +9199,7 @@
         <p:spPr>
           <a:xfrm>
             <a:off x="4968000" y="5004000"/>
-            <a:ext cx="3237120" cy="105120"/>
+            <a:ext cx="3236760" cy="104760"/>
           </a:xfrm>
           <a:prstGeom prst="rect">
             <a:avLst/>
@@ -11244,7 +9248,7 @@
         <p:spPr>
           <a:xfrm>
             <a:off x="8280000" y="5004000"/>
-            <a:ext cx="141120" cy="105120"/>
+            <a:ext cx="140760" cy="104760"/>
           </a:xfrm>
           <a:prstGeom prst="rect">
             <a:avLst/>
@@ -11268,7 +9272,7 @@
                 <a:spcPct val="100000"/>
               </a:lnSpc>
             </a:pPr>
-            <a:fld id="{C20E6E1C-27C4-4778-97CC-EC6C832AC7D0}" type="slidenum">
+            <a:fld id="{460BD974-67AE-484E-92D0-EE9D36FAA119}" type="slidenum">
               <a:rPr b="0" lang="en-US" sz="600" spc="-1" strike="noStrike">
                 <a:solidFill>
                   <a:srgbClr val="ffffff"/>
@@ -11276,7 +9280,7 @@
                 <a:latin typeface="Arial"/>
                 <a:ea typeface="DejaVu Sans"/>
               </a:rPr>
-              <a:t>&lt;number&gt;</a:t>
+              <a:t>1</a:t>
             </a:fld>
             <a:endParaRPr b="0" lang="en-US" sz="600" spc="-1" strike="noStrike">
               <a:latin typeface="Arial"/>
@@ -11297,7 +9301,7 @@
         <p:spPr>
           <a:xfrm>
             <a:off x="6840000" y="810000"/>
-            <a:ext cx="2301120" cy="3507120"/>
+            <a:ext cx="2300760" cy="3506760"/>
           </a:xfrm>
           <a:prstGeom prst="rect">
             <a:avLst/>
@@ -11368,7 +9372,7 @@
         <p:spPr>
           <a:xfrm>
             <a:off x="720000" y="288000"/>
-            <a:ext cx="6621120" cy="501120"/>
+            <a:ext cx="6620760" cy="500760"/>
           </a:xfrm>
           <a:prstGeom prst="rect">
             <a:avLst/>
@@ -11417,7 +9421,7 @@
         <p:spPr>
           <a:xfrm>
             <a:off x="4968000" y="5004000"/>
-            <a:ext cx="3237120" cy="105120"/>
+            <a:ext cx="3236760" cy="104760"/>
           </a:xfrm>
           <a:prstGeom prst="rect">
             <a:avLst/>
@@ -11466,7 +9470,7 @@
         <p:spPr>
           <a:xfrm>
             <a:off x="8280000" y="5004000"/>
-            <a:ext cx="141120" cy="105120"/>
+            <a:ext cx="140760" cy="104760"/>
           </a:xfrm>
           <a:prstGeom prst="rect">
             <a:avLst/>
@@ -11490,7 +9494,7 @@
                 <a:spcPct val="100000"/>
               </a:lnSpc>
             </a:pPr>
-            <a:fld id="{95BF1A23-CFD5-4CC0-B530-4B4E499ED455}" type="slidenum">
+            <a:fld id="{8E4E9DC4-5F85-4657-83EC-1FE2F390D17A}" type="slidenum">
               <a:rPr b="0" lang="en-US" sz="600" spc="-1" strike="noStrike">
                 <a:solidFill>
                   <a:srgbClr val="ffffff"/>
@@ -11498,7 +9502,7 @@
                 <a:latin typeface="Arial"/>
                 <a:ea typeface="DejaVu Sans"/>
               </a:rPr>
-              <a:t>&lt;number&gt;</a:t>
+              <a:t>1</a:t>
             </a:fld>
             <a:endParaRPr b="0" lang="en-US" sz="600" spc="-1" strike="noStrike">
               <a:latin typeface="Arial"/>
@@ -11515,7 +9519,7 @@
         <p:spPr>
           <a:xfrm>
             <a:off x="876240" y="548640"/>
-            <a:ext cx="6621120" cy="3884400"/>
+            <a:ext cx="6620760" cy="3884040"/>
           </a:xfrm>
           <a:prstGeom prst="rect">
             <a:avLst/>
@@ -11544,7 +9548,7 @@
             </a:endParaRPr>
           </a:p>
           <a:p>
-            <a:pPr marL="285840" indent="-282960">
+            <a:pPr marL="285840" indent="-282600">
               <a:lnSpc>
                 <a:spcPct val="120000"/>
               </a:lnSpc>
@@ -11565,10 +9569,11 @@
               <a:t>Git clone </a:t>
             </a:r>
             <a:r>
-              <a:rPr b="0" lang="en-US" sz="1500" spc="-1" strike="noStrike">
+              <a:rPr b="0" lang="en-US" sz="1500" spc="-1" strike="noStrike" u="sng">
                 <a:solidFill>
-                  <a:srgbClr val="000000"/>
+                  <a:srgbClr val="0000ff"/>
                 </a:solidFill>
+                <a:uFillTx/>
                 <a:latin typeface="Arial"/>
                 <a:ea typeface="DejaVu Sans"/>
                 <a:hlinkClick r:id="rId1"/>
@@ -11580,7 +9585,17 @@
             </a:endParaRPr>
           </a:p>
           <a:p>
-            <a:pPr marL="285840" indent="-282960">
+            <a:pPr>
+              <a:lnSpc>
+                <a:spcPct val="120000"/>
+              </a:lnSpc>
+            </a:pPr>
+            <a:endParaRPr b="0" lang="en-US" sz="1500" spc="-1" strike="noStrike">
+              <a:latin typeface="Arial"/>
+            </a:endParaRPr>
+          </a:p>
+          <a:p>
+            <a:pPr marL="285840" indent="-282600">
               <a:lnSpc>
                 <a:spcPct val="120000"/>
               </a:lnSpc>
@@ -11590,21 +9605,6 @@
               <a:buFont typeface="Arial"/>
               <a:buChar char="•"/>
             </a:pPr>
-            <a:endParaRPr b="0" lang="en-US" sz="1500" spc="-1" strike="noStrike">
-              <a:latin typeface="Arial"/>
-            </a:endParaRPr>
-          </a:p>
-          <a:p>
-            <a:pPr marL="285840" indent="-282960">
-              <a:lnSpc>
-                <a:spcPct val="120000"/>
-              </a:lnSpc>
-              <a:buClr>
-                <a:srgbClr val="000000"/>
-              </a:buClr>
-              <a:buFont typeface="Arial"/>
-              <a:buChar char="•"/>
-            </a:pPr>
             <a:r>
               <a:rPr b="0" lang="en-US" sz="1500" spc="-1" strike="noStrike">
                 <a:solidFill>
@@ -11620,7 +9620,7 @@
             </a:endParaRPr>
           </a:p>
           <a:p>
-            <a:pPr lvl="1" marL="432000" indent="-216000">
+            <a:pPr lvl="1" marL="432000" indent="-215640">
               <a:lnSpc>
                 <a:spcPct val="120000"/>
               </a:lnSpc>
@@ -11646,7 +9646,7 @@
             </a:endParaRPr>
           </a:p>
           <a:p>
-            <a:pPr lvl="1" marL="432000" indent="-216000">
+            <a:pPr lvl="1" marL="432000" indent="-215640">
               <a:lnSpc>
                 <a:spcPct val="120000"/>
               </a:lnSpc>
@@ -11672,7 +9672,7 @@
             </a:endParaRPr>
           </a:p>
           <a:p>
-            <a:pPr lvl="1" marL="432000" indent="-216000">
+            <a:pPr lvl="1" marL="432000" indent="-215640">
               <a:lnSpc>
                 <a:spcPct val="120000"/>
               </a:lnSpc>
@@ -11698,7 +9698,7 @@
             </a:endParaRPr>
           </a:p>
           <a:p>
-            <a:pPr lvl="1" marL="432000" indent="-216000">
+            <a:pPr lvl="1" marL="432000" indent="-215640">
               <a:lnSpc>
                 <a:spcPct val="120000"/>
               </a:lnSpc>
@@ -11724,7 +9724,7 @@
             </a:endParaRPr>
           </a:p>
           <a:p>
-            <a:pPr marL="285840" indent="-282960">
+            <a:pPr marL="285840" indent="-282600">
               <a:lnSpc>
                 <a:spcPct val="120000"/>
               </a:lnSpc>
@@ -11749,7 +9749,17 @@
             </a:endParaRPr>
           </a:p>
           <a:p>
-            <a:pPr marL="285840" indent="-282960">
+            <a:pPr>
+              <a:lnSpc>
+                <a:spcPct val="120000"/>
+              </a:lnSpc>
+            </a:pPr>
+            <a:endParaRPr b="0" lang="en-US" sz="1500" spc="-1" strike="noStrike">
+              <a:latin typeface="Arial"/>
+            </a:endParaRPr>
+          </a:p>
+          <a:p>
+            <a:pPr marL="285840" indent="-282600">
               <a:lnSpc>
                 <a:spcPct val="120000"/>
               </a:lnSpc>
@@ -11759,21 +9769,6 @@
               <a:buFont typeface="Arial"/>
               <a:buChar char="•"/>
             </a:pPr>
-            <a:endParaRPr b="0" lang="en-US" sz="1500" spc="-1" strike="noStrike">
-              <a:latin typeface="Arial"/>
-            </a:endParaRPr>
-          </a:p>
-          <a:p>
-            <a:pPr marL="285840" indent="-282960">
-              <a:lnSpc>
-                <a:spcPct val="120000"/>
-              </a:lnSpc>
-              <a:buClr>
-                <a:srgbClr val="000000"/>
-              </a:buClr>
-              <a:buFont typeface="Arial"/>
-              <a:buChar char="•"/>
-            </a:pPr>
             <a:r>
               <a:rPr b="0" lang="en-US" sz="1500" spc="-1" strike="noStrike">
                 <a:solidFill>
@@ -11789,7 +9784,7 @@
             </a:endParaRPr>
           </a:p>
           <a:p>
-            <a:pPr marL="285840" indent="-282960">
+            <a:pPr marL="285840" indent="-282600">
               <a:lnSpc>
                 <a:spcPct val="120000"/>
               </a:lnSpc>
@@ -11913,7 +9908,7 @@
         <p:spPr>
           <a:xfrm>
             <a:off x="720000" y="288000"/>
-            <a:ext cx="6621120" cy="501120"/>
+            <a:ext cx="6620760" cy="500760"/>
           </a:xfrm>
           <a:prstGeom prst="rect">
             <a:avLst/>
@@ -11962,7 +9957,7 @@
         <p:spPr>
           <a:xfrm>
             <a:off x="4968000" y="5004000"/>
-            <a:ext cx="3237120" cy="105120"/>
+            <a:ext cx="3236760" cy="104760"/>
           </a:xfrm>
           <a:prstGeom prst="rect">
             <a:avLst/>
@@ -12011,7 +10006,7 @@
         <p:spPr>
           <a:xfrm>
             <a:off x="8280000" y="5004000"/>
-            <a:ext cx="141120" cy="105120"/>
+            <a:ext cx="140760" cy="104760"/>
           </a:xfrm>
           <a:prstGeom prst="rect">
             <a:avLst/>
@@ -12035,7 +10030,7 @@
                 <a:spcPct val="100000"/>
               </a:lnSpc>
             </a:pPr>
-            <a:fld id="{3EE55890-C57A-4115-9A4A-875F25B02EA2}" type="slidenum">
+            <a:fld id="{D1B0438D-7380-4452-887B-87AE7960867B}" type="slidenum">
               <a:rPr b="0" lang="en-US" sz="600" spc="-1" strike="noStrike">
                 <a:solidFill>
                   <a:srgbClr val="ffffff"/>
@@ -12043,7 +10038,7 @@
                 <a:latin typeface="Arial"/>
                 <a:ea typeface="DejaVu Sans"/>
               </a:rPr>
-              <a:t>&lt;number&gt;</a:t>
+              <a:t>1</a:t>
             </a:fld>
             <a:endParaRPr b="0" lang="en-US" sz="600" spc="-1" strike="noStrike">
               <a:latin typeface="Arial"/>
@@ -12060,7 +10055,7 @@
         <p:spPr>
           <a:xfrm>
             <a:off x="640080" y="822960"/>
-            <a:ext cx="6621120" cy="3884400"/>
+            <a:ext cx="6620760" cy="3884040"/>
           </a:xfrm>
           <a:prstGeom prst="rect">
             <a:avLst/>
@@ -12089,7 +10084,7 @@
             </a:endParaRPr>
           </a:p>
           <a:p>
-            <a:pPr marL="285840" indent="-282960">
+            <a:pPr marL="285840" indent="-282600">
               <a:lnSpc>
                 <a:spcPct val="120000"/>
               </a:lnSpc>
@@ -12114,7 +10109,7 @@
             </a:endParaRPr>
           </a:p>
           <a:p>
-            <a:pPr marL="285840" indent="-282960">
+            <a:pPr marL="285840" indent="-282600">
               <a:lnSpc>
                 <a:spcPct val="120000"/>
               </a:lnSpc>
@@ -12139,7 +10134,7 @@
             </a:endParaRPr>
           </a:p>
           <a:p>
-            <a:pPr marL="285840" indent="-282960">
+            <a:pPr marL="285840" indent="-282600">
               <a:lnSpc>
                 <a:spcPct val="120000"/>
               </a:lnSpc>
@@ -12164,7 +10159,7 @@
             </a:endParaRPr>
           </a:p>
           <a:p>
-            <a:pPr marL="285840" indent="-282960">
+            <a:pPr marL="285840" indent="-282600">
               <a:lnSpc>
                 <a:spcPct val="120000"/>
               </a:lnSpc>
@@ -12199,7 +10194,7 @@
             </a:endParaRPr>
           </a:p>
           <a:p>
-            <a:pPr marL="285840" indent="-282960">
+            <a:pPr marL="285840" indent="-282600">
               <a:lnSpc>
                 <a:spcPct val="120000"/>
               </a:lnSpc>
@@ -12224,7 +10219,7 @@
             </a:endParaRPr>
           </a:p>
           <a:p>
-            <a:pPr marL="285840" indent="-282960">
+            <a:pPr marL="285840" indent="-282600">
               <a:lnSpc>
                 <a:spcPct val="120000"/>
               </a:lnSpc>

</xml_diff>